<commit_message>
Add week 1 assignment review recording.
</commit_message>
<xml_diff>
--- a/CPSC-24500/Week03/2017SpringW03Slides.pptx
+++ b/CPSC-24500/Week03/2017SpringW03Slides.pptx
@@ -5,7 +5,7 @@
     <p:sldMasterId id="2147483648" r:id="rId4"/>
   </p:sldMasterIdLst>
   <p:notesMasterIdLst>
-    <p:notesMasterId r:id="rId42"/>
+    <p:notesMasterId r:id="rId44"/>
   </p:notesMasterIdLst>
   <p:sldIdLst>
     <p:sldId id="381" r:id="rId5"/>
@@ -34,17 +34,19 @@
     <p:sldId id="387" r:id="rId28"/>
     <p:sldId id="392" r:id="rId29"/>
     <p:sldId id="388" r:id="rId30"/>
-    <p:sldId id="389" r:id="rId31"/>
-    <p:sldId id="402" r:id="rId32"/>
-    <p:sldId id="391" r:id="rId33"/>
-    <p:sldId id="393" r:id="rId34"/>
-    <p:sldId id="397" r:id="rId35"/>
-    <p:sldId id="403" r:id="rId36"/>
-    <p:sldId id="404" r:id="rId37"/>
-    <p:sldId id="405" r:id="rId38"/>
-    <p:sldId id="399" r:id="rId39"/>
-    <p:sldId id="398" r:id="rId40"/>
-    <p:sldId id="396" r:id="rId41"/>
+    <p:sldId id="409" r:id="rId31"/>
+    <p:sldId id="389" r:id="rId32"/>
+    <p:sldId id="402" r:id="rId33"/>
+    <p:sldId id="408" r:id="rId34"/>
+    <p:sldId id="391" r:id="rId35"/>
+    <p:sldId id="393" r:id="rId36"/>
+    <p:sldId id="397" r:id="rId37"/>
+    <p:sldId id="403" r:id="rId38"/>
+    <p:sldId id="404" r:id="rId39"/>
+    <p:sldId id="405" r:id="rId40"/>
+    <p:sldId id="399" r:id="rId41"/>
+    <p:sldId id="398" r:id="rId42"/>
+    <p:sldId id="396" r:id="rId43"/>
   </p:sldIdLst>
   <p:sldSz cx="12192000" cy="6858000"/>
   <p:notesSz cx="7315200" cy="9601200"/>
@@ -236,7 +238,7 @@
           <a:p>
             <a:fld id="{91ED72D7-FE6F-4B82-8D31-76BC00B06094}" type="datetimeFigureOut">
               <a:rPr lang="en-US" smtClean="0"/>
-              <a:t>4/1/2017</a:t>
+              <a:t>4/4/2017</a:t>
             </a:fld>
             <a:endParaRPr lang="en-US"/>
           </a:p>
@@ -2363,9 +2365,61 @@
           </a:p>
           <a:p>
             <a:r>
+              <a:rPr lang="en-US" sz="1000" b="1" dirty="0"/>
+              <a:t>**Start Recording</a:t>
+            </a:r>
+          </a:p>
+          <a:p>
+            <a:endParaRPr lang="en-US" sz="1000" dirty="0"/>
+          </a:p>
+          <a:p>
+            <a:r>
               <a:rPr lang="en-US" sz="1000" dirty="0"/>
-              <a:t>I am going to stat recording so that other can watch later; however, if I think that is impacting our ability to have a good discussion, I will stop the recording and just send out notes later.</a:t>
-            </a:r>
+              <a:t>Comments:</a:t>
+            </a:r>
+          </a:p>
+          <a:p>
+            <a:pPr marL="0" marR="0" lvl="0" indent="0" algn="l" defTabSz="914400" rtl="0" eaLnBrk="1" fontAlgn="auto" latinLnBrk="0" hangingPunct="1">
+              <a:lnSpc>
+                <a:spcPct val="100000"/>
+              </a:lnSpc>
+              <a:spcBef>
+                <a:spcPts val="0"/>
+              </a:spcBef>
+              <a:spcAft>
+                <a:spcPts val="0"/>
+              </a:spcAft>
+              <a:buClrTx/>
+              <a:buSzTx/>
+              <a:buFontTx/>
+              <a:buNone/>
+              <a:tabLst/>
+              <a:defRPr/>
+            </a:pPr>
+            <a:r>
+              <a:rPr lang="en-US" sz="1000" dirty="0"/>
+              <a:t>I will post our week 1 assignment review via a separate video. I think it will take away from our current discussion if we try to intermix the topics today. I want of to have laser focus on our programming assignment today. </a:t>
+            </a:r>
+          </a:p>
+          <a:p>
+            <a:pPr marL="0" marR="0" lvl="0" indent="0" algn="l" defTabSz="914400" rtl="0" eaLnBrk="1" fontAlgn="auto" latinLnBrk="0" hangingPunct="1">
+              <a:lnSpc>
+                <a:spcPct val="100000"/>
+              </a:lnSpc>
+              <a:spcBef>
+                <a:spcPts val="0"/>
+              </a:spcBef>
+              <a:spcAft>
+                <a:spcPts val="0"/>
+              </a:spcAft>
+              <a:buClrTx/>
+              <a:buSzTx/>
+              <a:buFontTx/>
+              <a:buNone/>
+              <a:tabLst/>
+              <a:defRPr/>
+            </a:pPr>
+            <a:endParaRPr lang="en-US" sz="1000" dirty="0"/>
           </a:p>
         </p:txBody>
       </p:sp>
@@ -2534,113 +2588,106 @@
           <a:lstStyle/>
           <a:p>
             <a:r>
+              <a:rPr lang="en-US" sz="1000" dirty="0"/>
+              <a:t>This is different from environments where developers (or designers) layout screens pixel by pixel (like Visual Basic for example). With modern UIs that need to fit in all types of sizes and orientations, layout managers are a necessity.  </a:t>
+            </a:r>
+          </a:p>
+          <a:p>
+            <a:endParaRPr lang="en-US" sz="1000" dirty="0"/>
+          </a:p>
+          <a:p>
+            <a:r>
+              <a:rPr lang="en-US" sz="1000" dirty="0"/>
+              <a:t>Several AWT and Swing classes provide layout managers for general use:</a:t>
+            </a:r>
+          </a:p>
+          <a:p>
+            <a:pPr marL="171450" indent="-171450">
+              <a:buFont typeface="Arial" panose="020B0604020202020204" pitchFamily="34" charset="0"/>
+              <a:buChar char="•"/>
+            </a:pPr>
+            <a:r>
               <a:rPr lang="en-US" sz="1000" dirty="0" err="1"/>
-              <a:t>JavaDoc</a:t>
-            </a:r>
-            <a:r>
-              <a:rPr lang="en-US" sz="1000" dirty="0"/>
-              <a:t>:</a:t>
-            </a:r>
-          </a:p>
-          <a:p>
-            <a:r>
-              <a:rPr lang="en-US" sz="1000" dirty="0"/>
-              <a:t>https://docs.oracle.com/javase/7/docs/api/java/awt/Graphics.html</a:t>
-            </a:r>
-          </a:p>
-          <a:p>
+              <a:t>BorderLayout</a:t>
+            </a:r>
             <a:endParaRPr lang="en-US" sz="1000" dirty="0"/>
           </a:p>
           <a:p>
-            <a:r>
-              <a:rPr lang="en-US" sz="1000" dirty="0"/>
-              <a:t>Java Graphics Tutorial:</a:t>
-            </a:r>
-          </a:p>
-          <a:p>
-            <a:r>
-              <a:rPr lang="en-US" sz="1000" dirty="0"/>
-              <a:t>https://docs.oracle.com/javase/tutorial/2d/basic2d/</a:t>
-            </a:r>
-          </a:p>
-          <a:p>
+            <a:pPr marL="171450" indent="-171450">
+              <a:buFont typeface="Arial" panose="020B0604020202020204" pitchFamily="34" charset="0"/>
+              <a:buChar char="•"/>
+            </a:pPr>
+            <a:r>
+              <a:rPr lang="en-US" sz="1000" dirty="0" err="1"/>
+              <a:t>BoxLayout</a:t>
+            </a:r>
             <a:endParaRPr lang="en-US" sz="1000" dirty="0"/>
           </a:p>
           <a:p>
+            <a:pPr marL="171450" indent="-171450">
+              <a:buFont typeface="Arial" panose="020B0604020202020204" pitchFamily="34" charset="0"/>
+              <a:buChar char="•"/>
+            </a:pPr>
             <a:r>
               <a:rPr lang="en-US" sz="1000" dirty="0" err="1"/>
-              <a:t>drawArc</a:t>
-            </a:r>
-            <a:r>
-              <a:rPr lang="en-US" sz="1000" dirty="0"/>
-              <a:t>:</a:t>
-            </a:r>
-          </a:p>
-          <a:p>
-            <a:r>
-              <a:rPr lang="en-US" sz="1000" dirty="0"/>
-              <a:t>http://www.java2s.com/Code/JavaAPI/java.awt/GraphicsdrawArcintxintyintwidthintheightintstartAngleintarcAngle.htm</a:t>
-            </a:r>
-          </a:p>
-          <a:p>
+              <a:t>CardLayout</a:t>
+            </a:r>
             <a:endParaRPr lang="en-US" sz="1000" dirty="0"/>
           </a:p>
           <a:p>
+            <a:pPr marL="171450" indent="-171450">
+              <a:buFont typeface="Arial" panose="020B0604020202020204" pitchFamily="34" charset="0"/>
+              <a:buChar char="•"/>
+            </a:pPr>
             <a:r>
               <a:rPr lang="en-US" sz="1000" dirty="0" err="1"/>
-              <a:t>drawArc</a:t>
-            </a:r>
-            <a:r>
-              <a:rPr lang="en-US" sz="1000" dirty="0"/>
-              <a:t> Example:</a:t>
-            </a:r>
-          </a:p>
-          <a:p>
-            <a:r>
-              <a:rPr lang="en-US" sz="1000" dirty="0"/>
-              <a:t>http://www.java-examples.com/draw-arc-applet-window-example</a:t>
-            </a:r>
-          </a:p>
-          <a:p>
+              <a:t>FlowLayout</a:t>
+            </a:r>
             <a:endParaRPr lang="en-US" sz="1000" dirty="0"/>
           </a:p>
           <a:p>
-            <a:r>
-              <a:rPr lang="en-US" sz="1000" dirty="0"/>
-              <a:t>Repaint Sequence:</a:t>
-            </a:r>
-          </a:p>
-          <a:p>
-            <a:r>
-              <a:rPr lang="en-US" sz="1000" dirty="0"/>
-              <a:t>OS -&gt; Frame -&gt; Frame’s paint function -&gt; each  LW component </a:t>
-            </a:r>
+            <a:pPr marL="171450" indent="-171450">
+              <a:buFont typeface="Arial" panose="020B0604020202020204" pitchFamily="34" charset="0"/>
+              <a:buChar char="•"/>
+            </a:pPr>
             <a:r>
               <a:rPr lang="en-US" sz="1000" dirty="0" err="1"/>
-              <a:t>paintComponent</a:t>
-            </a:r>
-            <a:r>
-              <a:rPr lang="en-US" sz="1000" dirty="0"/>
-              <a:t> function</a:t>
-            </a:r>
-          </a:p>
-          <a:p>
+              <a:t>GridBagLayout</a:t>
+            </a:r>
             <a:endParaRPr lang="en-US" sz="1000" dirty="0"/>
           </a:p>
           <a:p>
+            <a:pPr marL="171450" indent="-171450">
+              <a:buFont typeface="Arial" panose="020B0604020202020204" pitchFamily="34" charset="0"/>
+              <a:buChar char="•"/>
+            </a:pPr>
+            <a:r>
+              <a:rPr lang="en-US" sz="1000" dirty="0" err="1"/>
+              <a:t>GridLayout</a:t>
+            </a:r>
             <a:endParaRPr lang="en-US" sz="1000" dirty="0"/>
           </a:p>
           <a:p>
+            <a:pPr marL="171450" indent="-171450">
+              <a:buFont typeface="Arial" panose="020B0604020202020204" pitchFamily="34" charset="0"/>
+              <a:buChar char="•"/>
+            </a:pPr>
+            <a:r>
+              <a:rPr lang="en-US" sz="1000" dirty="0" err="1"/>
+              <a:t>GroupLayout</a:t>
+            </a:r>
             <a:endParaRPr lang="en-US" sz="1000" dirty="0"/>
           </a:p>
           <a:p>
+            <a:pPr marL="171450" indent="-171450">
+              <a:buFont typeface="Arial" panose="020B0604020202020204" pitchFamily="34" charset="0"/>
+              <a:buChar char="•"/>
+            </a:pPr>
+            <a:r>
+              <a:rPr lang="en-US" sz="1000" dirty="0" err="1"/>
+              <a:t>SpringLayout</a:t>
+            </a:r>
             <a:endParaRPr lang="en-US" sz="1000" dirty="0"/>
-          </a:p>
-          <a:p>
-            <a:r>
-              <a:rPr lang="en-US" sz="1000" dirty="0"/>
-              <a:t> </a:t>
-            </a:r>
           </a:p>
         </p:txBody>
       </p:sp>
@@ -2670,7 +2717,7 @@
     </p:spTree>
     <p:extLst>
       <p:ext uri="{BB962C8B-B14F-4D97-AF65-F5344CB8AC3E}">
-        <p14:creationId xmlns:p14="http://schemas.microsoft.com/office/powerpoint/2010/main" val="3874666517"/>
+        <p14:creationId xmlns:p14="http://schemas.microsoft.com/office/powerpoint/2010/main" val="2114434865"/>
       </p:ext>
     </p:extLst>
   </p:cSld>
@@ -2724,7 +2771,123 @@
           <a:bodyPr/>
           <a:lstStyle/>
           <a:p>
-            <a:endParaRPr lang="en-US"/>
+            <a:r>
+              <a:rPr lang="en-US" sz="1000" dirty="0"/>
+              <a:t>This is your second or third time seeing this. After today, you should mostly “get it”. </a:t>
+            </a:r>
+          </a:p>
+          <a:p>
+            <a:endParaRPr lang="en-US" sz="1000" dirty="0"/>
+          </a:p>
+          <a:p>
+            <a:r>
+              <a:rPr lang="en-US" sz="1000" dirty="0" err="1"/>
+              <a:t>JavaDoc</a:t>
+            </a:r>
+            <a:r>
+              <a:rPr lang="en-US" sz="1000" dirty="0"/>
+              <a:t>:</a:t>
+            </a:r>
+          </a:p>
+          <a:p>
+            <a:r>
+              <a:rPr lang="en-US" sz="1000" dirty="0"/>
+              <a:t>https://docs.oracle.com/javase/7/docs/api/java/awt/Graphics.html</a:t>
+            </a:r>
+          </a:p>
+          <a:p>
+            <a:endParaRPr lang="en-US" sz="1000" dirty="0"/>
+          </a:p>
+          <a:p>
+            <a:r>
+              <a:rPr lang="en-US" sz="1000" dirty="0"/>
+              <a:t>Java Graphics Tutorial:</a:t>
+            </a:r>
+          </a:p>
+          <a:p>
+            <a:r>
+              <a:rPr lang="en-US" sz="1000" dirty="0"/>
+              <a:t>https://docs.oracle.com/javase/tutorial/2d/basic2d/</a:t>
+            </a:r>
+          </a:p>
+          <a:p>
+            <a:endParaRPr lang="en-US" sz="1000" dirty="0"/>
+          </a:p>
+          <a:p>
+            <a:r>
+              <a:rPr lang="en-US" sz="1000" dirty="0" err="1"/>
+              <a:t>drawArc</a:t>
+            </a:r>
+            <a:r>
+              <a:rPr lang="en-US" sz="1000" dirty="0"/>
+              <a:t>:</a:t>
+            </a:r>
+          </a:p>
+          <a:p>
+            <a:r>
+              <a:rPr lang="en-US" sz="1000" dirty="0"/>
+              <a:t>http://www.java2s.com/Code/JavaAPI/java.awt/GraphicsdrawArcintxintyintwidthintheightintstartAngleintarcAngle.htm</a:t>
+            </a:r>
+          </a:p>
+          <a:p>
+            <a:endParaRPr lang="en-US" sz="1000" dirty="0"/>
+          </a:p>
+          <a:p>
+            <a:r>
+              <a:rPr lang="en-US" sz="1000" dirty="0" err="1"/>
+              <a:t>drawArc</a:t>
+            </a:r>
+            <a:r>
+              <a:rPr lang="en-US" sz="1000" dirty="0"/>
+              <a:t> Example:</a:t>
+            </a:r>
+          </a:p>
+          <a:p>
+            <a:r>
+              <a:rPr lang="en-US" sz="1000" dirty="0"/>
+              <a:t>http://www.java-examples.com/draw-arc-applet-window-example</a:t>
+            </a:r>
+          </a:p>
+          <a:p>
+            <a:endParaRPr lang="en-US" sz="1000" dirty="0"/>
+          </a:p>
+          <a:p>
+            <a:r>
+              <a:rPr lang="en-US" sz="1000" dirty="0"/>
+              <a:t>Repaint Sequence:</a:t>
+            </a:r>
+          </a:p>
+          <a:p>
+            <a:r>
+              <a:rPr lang="en-US" sz="1000" dirty="0"/>
+              <a:t>OS -&gt; Frame -&gt; Frame’s paint function -&gt; each  LW component </a:t>
+            </a:r>
+            <a:r>
+              <a:rPr lang="en-US" sz="1000" dirty="0" err="1"/>
+              <a:t>paintComponent</a:t>
+            </a:r>
+            <a:r>
+              <a:rPr lang="en-US" sz="1000" dirty="0"/>
+              <a:t> function</a:t>
+            </a:r>
+          </a:p>
+          <a:p>
+            <a:endParaRPr lang="en-US" sz="1000" dirty="0"/>
+          </a:p>
+          <a:p>
+            <a:endParaRPr lang="en-US" sz="1000" dirty="0"/>
+          </a:p>
+          <a:p>
+            <a:endParaRPr lang="en-US" sz="1000" dirty="0"/>
+          </a:p>
+          <a:p>
+            <a:endParaRPr lang="en-US" sz="1000" dirty="0"/>
+          </a:p>
+          <a:p>
+            <a:r>
+              <a:rPr lang="en-US" sz="1000" dirty="0"/>
+              <a:t> </a:t>
+            </a:r>
           </a:p>
         </p:txBody>
       </p:sp>
@@ -2754,7 +2917,7 @@
     </p:spTree>
     <p:extLst>
       <p:ext uri="{BB962C8B-B14F-4D97-AF65-F5344CB8AC3E}">
-        <p14:creationId xmlns:p14="http://schemas.microsoft.com/office/powerpoint/2010/main" val="2473152287"/>
+        <p14:creationId xmlns:p14="http://schemas.microsoft.com/office/powerpoint/2010/main" val="3874666517"/>
       </p:ext>
     </p:extLst>
   </p:cSld>
@@ -2808,7 +2971,42 @@
           <a:bodyPr/>
           <a:lstStyle/>
           <a:p>
-            <a:endParaRPr lang="en-US"/>
+            <a:r>
+              <a:rPr lang="en-US" dirty="0"/>
+              <a:t>You can imagine that  we are going to need </a:t>
+            </a:r>
+            <a:r>
+              <a:rPr lang="en-US" dirty="0" err="1"/>
+              <a:t>JFrames</a:t>
+            </a:r>
+            <a:r>
+              <a:rPr lang="en-US" dirty="0"/>
+              <a:t>, </a:t>
+            </a:r>
+            <a:r>
+              <a:rPr lang="en-US" dirty="0" err="1"/>
+              <a:t>Jpanels</a:t>
+            </a:r>
+            <a:r>
+              <a:rPr lang="en-US" dirty="0"/>
+              <a:t> (x2), Border Layouts, Flow Layouts, </a:t>
+            </a:r>
+            <a:r>
+              <a:rPr lang="en-US" dirty="0" err="1"/>
+              <a:t>JButton</a:t>
+            </a:r>
+            <a:r>
+              <a:rPr lang="en-US" dirty="0"/>
+              <a:t>, Action Listeners, Action Events, Containers, Random, Graphics, </a:t>
+            </a:r>
+            <a:r>
+              <a:rPr lang="en-US" dirty="0" err="1"/>
+              <a:t>ArrayLists</a:t>
+            </a:r>
+            <a:r>
+              <a:rPr lang="en-US" dirty="0"/>
+              <a:t>, and more…</a:t>
+            </a:r>
           </a:p>
         </p:txBody>
       </p:sp>
@@ -2838,7 +3036,7 @@
     </p:spTree>
     <p:extLst>
       <p:ext uri="{BB962C8B-B14F-4D97-AF65-F5344CB8AC3E}">
-        <p14:creationId xmlns:p14="http://schemas.microsoft.com/office/powerpoint/2010/main" val="2944127336"/>
+        <p14:creationId xmlns:p14="http://schemas.microsoft.com/office/powerpoint/2010/main" val="2473152287"/>
       </p:ext>
     </p:extLst>
   </p:cSld>
@@ -2976,19 +3174,7 @@
           <a:bodyPr/>
           <a:lstStyle/>
           <a:p>
-            <a:r>
-              <a:rPr lang="en-US" sz="1000" dirty="0"/>
-              <a:t>While everyone is getting logged in an set up for our virtual discussion, I wanted to thank those of you who have posted their background and/or responded to other people’s discussion board posting. I have enjoyed reading through your comments. </a:t>
-            </a:r>
-          </a:p>
-          <a:p>
             <a:endParaRPr lang="en-US" sz="1000" dirty="0"/>
-          </a:p>
-          <a:p>
-            <a:r>
-              <a:rPr lang="en-US" sz="1000" dirty="0"/>
-              <a:t>I am going to stat recording so that other can watch later; however, if I think that is impacting our ability to have a good discussion, I will stop the recording and just send out notes later.</a:t>
-            </a:r>
           </a:p>
         </p:txBody>
       </p:sp>
@@ -3018,7 +3204,7 @@
     </p:spTree>
     <p:extLst>
       <p:ext uri="{BB962C8B-B14F-4D97-AF65-F5344CB8AC3E}">
-        <p14:creationId xmlns:p14="http://schemas.microsoft.com/office/powerpoint/2010/main" val="2283266762"/>
+        <p14:creationId xmlns:p14="http://schemas.microsoft.com/office/powerpoint/2010/main" val="1230372459"/>
       </p:ext>
     </p:extLst>
   </p:cSld>
@@ -3072,7 +3258,7 @@
           <a:bodyPr/>
           <a:lstStyle/>
           <a:p>
-            <a:endParaRPr lang="en-US" sz="1000" dirty="0"/>
+            <a:endParaRPr lang="en-US"/>
           </a:p>
         </p:txBody>
       </p:sp>
@@ -3095,14 +3281,14 @@
               <a:rPr lang="en-US" smtClean="0"/>
               <a:t>31</a:t>
             </a:fld>
-            <a:endParaRPr lang="en-US" dirty="0"/>
+            <a:endParaRPr lang="en-US"/>
           </a:p>
         </p:txBody>
       </p:sp>
     </p:spTree>
     <p:extLst>
       <p:ext uri="{BB962C8B-B14F-4D97-AF65-F5344CB8AC3E}">
-        <p14:creationId xmlns:p14="http://schemas.microsoft.com/office/powerpoint/2010/main" val="1231578778"/>
+        <p14:creationId xmlns:p14="http://schemas.microsoft.com/office/powerpoint/2010/main" val="2944127336"/>
       </p:ext>
     </p:extLst>
   </p:cSld>
@@ -3156,7 +3342,19 @@
           <a:bodyPr/>
           <a:lstStyle/>
           <a:p>
+            <a:r>
+              <a:rPr lang="en-US" sz="1000" dirty="0"/>
+              <a:t>While everyone is getting logged in an set up for our virtual discussion, I wanted to thank those of you who have posted their background and/or responded to other people’s discussion board posting. I have enjoyed reading through your comments. </a:t>
+            </a:r>
+          </a:p>
+          <a:p>
             <a:endParaRPr lang="en-US" sz="1000" dirty="0"/>
+          </a:p>
+          <a:p>
+            <a:r>
+              <a:rPr lang="en-US" sz="1000" dirty="0"/>
+              <a:t>I am going to stat recording so that other can watch later; however, if I think that is impacting our ability to have a good discussion, I will stop the recording and just send out notes later.</a:t>
+            </a:r>
           </a:p>
         </p:txBody>
       </p:sp>
@@ -3179,14 +3377,14 @@
               <a:rPr lang="en-US" smtClean="0"/>
               <a:t>32</a:t>
             </a:fld>
-            <a:endParaRPr lang="en-US"/>
+            <a:endParaRPr lang="en-US" dirty="0"/>
           </a:p>
         </p:txBody>
       </p:sp>
     </p:spTree>
     <p:extLst>
       <p:ext uri="{BB962C8B-B14F-4D97-AF65-F5344CB8AC3E}">
-        <p14:creationId xmlns:p14="http://schemas.microsoft.com/office/powerpoint/2010/main" val="3902196225"/>
+        <p14:creationId xmlns:p14="http://schemas.microsoft.com/office/powerpoint/2010/main" val="2283266762"/>
       </p:ext>
     </p:extLst>
   </p:cSld>
@@ -3263,14 +3461,14 @@
               <a:rPr lang="en-US" smtClean="0"/>
               <a:t>33</a:t>
             </a:fld>
-            <a:endParaRPr lang="en-US"/>
+            <a:endParaRPr lang="en-US" dirty="0"/>
           </a:p>
         </p:txBody>
       </p:sp>
     </p:spTree>
     <p:extLst>
       <p:ext uri="{BB962C8B-B14F-4D97-AF65-F5344CB8AC3E}">
-        <p14:creationId xmlns:p14="http://schemas.microsoft.com/office/powerpoint/2010/main" val="404185822"/>
+        <p14:creationId xmlns:p14="http://schemas.microsoft.com/office/powerpoint/2010/main" val="1231578778"/>
       </p:ext>
     </p:extLst>
   </p:cSld>
@@ -3354,7 +3552,7 @@
     </p:spTree>
     <p:extLst>
       <p:ext uri="{BB962C8B-B14F-4D97-AF65-F5344CB8AC3E}">
-        <p14:creationId xmlns:p14="http://schemas.microsoft.com/office/powerpoint/2010/main" val="2837534126"/>
+        <p14:creationId xmlns:p14="http://schemas.microsoft.com/office/powerpoint/2010/main" val="3902196225"/>
       </p:ext>
     </p:extLst>
   </p:cSld>
@@ -3431,14 +3629,14 @@
               <a:rPr lang="en-US" smtClean="0"/>
               <a:t>35</a:t>
             </a:fld>
-            <a:endParaRPr lang="en-US" dirty="0"/>
+            <a:endParaRPr lang="en-US"/>
           </a:p>
         </p:txBody>
       </p:sp>
     </p:spTree>
     <p:extLst>
       <p:ext uri="{BB962C8B-B14F-4D97-AF65-F5344CB8AC3E}">
-        <p14:creationId xmlns:p14="http://schemas.microsoft.com/office/powerpoint/2010/main" val="4010339127"/>
+        <p14:creationId xmlns:p14="http://schemas.microsoft.com/office/powerpoint/2010/main" val="404185822"/>
       </p:ext>
     </p:extLst>
   </p:cSld>
@@ -3492,53 +3690,7 @@
           <a:bodyPr/>
           <a:lstStyle/>
           <a:p>
-            <a:pPr marL="0" indent="0">
-              <a:buNone/>
-            </a:pPr>
-            <a:r>
-              <a:rPr lang="en-US" sz="1000" dirty="0"/>
-              <a:t>I intentionally list our assignment first and our learning objectives second. This week our intent is to support our assignment  through our learning objectives, discussion, lecture, and examples… and not the other way around. </a:t>
-            </a:r>
-          </a:p>
-          <a:p>
-            <a:pPr marL="0" indent="0">
-              <a:buNone/>
-            </a:pPr>
             <a:endParaRPr lang="en-US" sz="1000" dirty="0"/>
-          </a:p>
-          <a:p>
-            <a:pPr marL="0" indent="0">
-              <a:buNone/>
-            </a:pPr>
-            <a:r>
-              <a:rPr lang="en-US" sz="1000" dirty="0"/>
-              <a:t>It is important to understand the concepts, practices, and principles; however, it is </a:t>
-            </a:r>
-            <a:r>
-              <a:rPr lang="en-US" sz="1000" u="sng" dirty="0"/>
-              <a:t>essential</a:t>
-            </a:r>
-            <a:r>
-              <a:rPr lang="en-US" sz="1000" dirty="0"/>
-              <a:t> that we can utilize them to deliver solutions. </a:t>
-            </a:r>
-          </a:p>
-          <a:p>
-            <a:pPr marL="0" indent="0">
-              <a:buNone/>
-            </a:pPr>
-            <a:r>
-              <a:rPr lang="en-US" sz="1000" dirty="0"/>
-              <a:t>The details of </a:t>
-            </a:r>
-            <a:r>
-              <a:rPr lang="en-US" sz="1000" dirty="0" err="1"/>
-              <a:t>FaceDraw</a:t>
-            </a:r>
-            <a:r>
-              <a:rPr lang="en-US" sz="1000" dirty="0"/>
-              <a:t> are provided in this week’s assignment. </a:t>
-            </a:r>
           </a:p>
         </p:txBody>
       </p:sp>
@@ -3568,7 +3720,7 @@
     </p:spTree>
     <p:extLst>
       <p:ext uri="{BB962C8B-B14F-4D97-AF65-F5344CB8AC3E}">
-        <p14:creationId xmlns:p14="http://schemas.microsoft.com/office/powerpoint/2010/main" val="849031050"/>
+        <p14:creationId xmlns:p14="http://schemas.microsoft.com/office/powerpoint/2010/main" val="2837534126"/>
       </p:ext>
     </p:extLst>
   </p:cSld>
@@ -3622,7 +3774,7 @@
           <a:bodyPr/>
           <a:lstStyle/>
           <a:p>
-            <a:endParaRPr lang="en-US"/>
+            <a:endParaRPr lang="en-US" sz="1000" dirty="0"/>
           </a:p>
         </p:txBody>
       </p:sp>
@@ -3644,6 +3796,220 @@
             <a:fld id="{5394DE12-7B9B-46AA-AC19-C30A49928B9B}" type="slidenum">
               <a:rPr lang="en-US" smtClean="0"/>
               <a:t>37</a:t>
+            </a:fld>
+            <a:endParaRPr lang="en-US" dirty="0"/>
+          </a:p>
+        </p:txBody>
+      </p:sp>
+    </p:spTree>
+    <p:extLst>
+      <p:ext uri="{BB962C8B-B14F-4D97-AF65-F5344CB8AC3E}">
+        <p14:creationId xmlns:p14="http://schemas.microsoft.com/office/powerpoint/2010/main" val="4010339127"/>
+      </p:ext>
+    </p:extLst>
+  </p:cSld>
+  <p:clrMapOvr>
+    <a:masterClrMapping/>
+  </p:clrMapOvr>
+</p:notes>
+</file>
+
+<file path=ppt/notesSlides/notesSlide38.xml><?xml version="1.0" encoding="utf-8"?>
+<p:notes xmlns:a="http://schemas.openxmlformats.org/drawingml/2006/main" xmlns:r="http://schemas.openxmlformats.org/officeDocument/2006/relationships" xmlns:p="http://schemas.openxmlformats.org/presentationml/2006/main">
+  <p:cSld>
+    <p:spTree>
+      <p:nvGrpSpPr>
+        <p:cNvPr id="1" name=""/>
+        <p:cNvGrpSpPr/>
+        <p:nvPr/>
+      </p:nvGrpSpPr>
+      <p:grpSpPr>
+        <a:xfrm>
+          <a:off x="0" y="0"/>
+          <a:ext cx="0" cy="0"/>
+          <a:chOff x="0" y="0"/>
+          <a:chExt cx="0" cy="0"/>
+        </a:xfrm>
+      </p:grpSpPr>
+      <p:sp>
+        <p:nvSpPr>
+          <p:cNvPr id="2" name="Slide Image Placeholder 1"/>
+          <p:cNvSpPr>
+            <a:spLocks noGrp="1" noRot="1" noChangeAspect="1"/>
+          </p:cNvSpPr>
+          <p:nvPr>
+            <p:ph type="sldImg"/>
+          </p:nvPr>
+        </p:nvSpPr>
+        <p:spPr/>
+      </p:sp>
+      <p:sp>
+        <p:nvSpPr>
+          <p:cNvPr id="3" name="Notes Placeholder 2"/>
+          <p:cNvSpPr>
+            <a:spLocks noGrp="1"/>
+          </p:cNvSpPr>
+          <p:nvPr>
+            <p:ph type="body" idx="1"/>
+          </p:nvPr>
+        </p:nvSpPr>
+        <p:spPr/>
+        <p:txBody>
+          <a:bodyPr/>
+          <a:lstStyle/>
+          <a:p>
+            <a:pPr marL="0" indent="0">
+              <a:buNone/>
+            </a:pPr>
+            <a:r>
+              <a:rPr lang="en-US" sz="1000" dirty="0"/>
+              <a:t>I intentionally list our assignment first and our learning objectives second. This week our intent is to support our assignment  through our learning objectives, discussion, lecture, and examples… and not the other way around. </a:t>
+            </a:r>
+          </a:p>
+          <a:p>
+            <a:pPr marL="0" indent="0">
+              <a:buNone/>
+            </a:pPr>
+            <a:endParaRPr lang="en-US" sz="1000" dirty="0"/>
+          </a:p>
+          <a:p>
+            <a:pPr marL="0" indent="0">
+              <a:buNone/>
+            </a:pPr>
+            <a:r>
+              <a:rPr lang="en-US" sz="1000" dirty="0"/>
+              <a:t>It is important to understand the concepts, practices, and principles; however, it is </a:t>
+            </a:r>
+            <a:r>
+              <a:rPr lang="en-US" sz="1000" u="sng" dirty="0"/>
+              <a:t>essential</a:t>
+            </a:r>
+            <a:r>
+              <a:rPr lang="en-US" sz="1000" dirty="0"/>
+              <a:t> that we can utilize them to deliver solutions. </a:t>
+            </a:r>
+          </a:p>
+          <a:p>
+            <a:pPr marL="0" indent="0">
+              <a:buNone/>
+            </a:pPr>
+            <a:r>
+              <a:rPr lang="en-US" sz="1000" dirty="0"/>
+              <a:t>The details of </a:t>
+            </a:r>
+            <a:r>
+              <a:rPr lang="en-US" sz="1000" dirty="0" err="1"/>
+              <a:t>FaceDraw</a:t>
+            </a:r>
+            <a:r>
+              <a:rPr lang="en-US" sz="1000" dirty="0"/>
+              <a:t> are provided in this week’s assignment. </a:t>
+            </a:r>
+          </a:p>
+        </p:txBody>
+      </p:sp>
+      <p:sp>
+        <p:nvSpPr>
+          <p:cNvPr id="4" name="Slide Number Placeholder 3"/>
+          <p:cNvSpPr>
+            <a:spLocks noGrp="1"/>
+          </p:cNvSpPr>
+          <p:nvPr>
+            <p:ph type="sldNum" sz="quarter" idx="10"/>
+          </p:nvPr>
+        </p:nvSpPr>
+        <p:spPr/>
+        <p:txBody>
+          <a:bodyPr/>
+          <a:lstStyle/>
+          <a:p>
+            <a:fld id="{5394DE12-7B9B-46AA-AC19-C30A49928B9B}" type="slidenum">
+              <a:rPr lang="en-US" smtClean="0"/>
+              <a:t>38</a:t>
+            </a:fld>
+            <a:endParaRPr lang="en-US"/>
+          </a:p>
+        </p:txBody>
+      </p:sp>
+    </p:spTree>
+    <p:extLst>
+      <p:ext uri="{BB962C8B-B14F-4D97-AF65-F5344CB8AC3E}">
+        <p14:creationId xmlns:p14="http://schemas.microsoft.com/office/powerpoint/2010/main" val="849031050"/>
+      </p:ext>
+    </p:extLst>
+  </p:cSld>
+  <p:clrMapOvr>
+    <a:masterClrMapping/>
+  </p:clrMapOvr>
+</p:notes>
+</file>
+
+<file path=ppt/notesSlides/notesSlide39.xml><?xml version="1.0" encoding="utf-8"?>
+<p:notes xmlns:a="http://schemas.openxmlformats.org/drawingml/2006/main" xmlns:r="http://schemas.openxmlformats.org/officeDocument/2006/relationships" xmlns:p="http://schemas.openxmlformats.org/presentationml/2006/main">
+  <p:cSld>
+    <p:spTree>
+      <p:nvGrpSpPr>
+        <p:cNvPr id="1" name=""/>
+        <p:cNvGrpSpPr/>
+        <p:nvPr/>
+      </p:nvGrpSpPr>
+      <p:grpSpPr>
+        <a:xfrm>
+          <a:off x="0" y="0"/>
+          <a:ext cx="0" cy="0"/>
+          <a:chOff x="0" y="0"/>
+          <a:chExt cx="0" cy="0"/>
+        </a:xfrm>
+      </p:grpSpPr>
+      <p:sp>
+        <p:nvSpPr>
+          <p:cNvPr id="2" name="Slide Image Placeholder 1"/>
+          <p:cNvSpPr>
+            <a:spLocks noGrp="1" noRot="1" noChangeAspect="1"/>
+          </p:cNvSpPr>
+          <p:nvPr>
+            <p:ph type="sldImg"/>
+          </p:nvPr>
+        </p:nvSpPr>
+        <p:spPr/>
+      </p:sp>
+      <p:sp>
+        <p:nvSpPr>
+          <p:cNvPr id="3" name="Notes Placeholder 2"/>
+          <p:cNvSpPr>
+            <a:spLocks noGrp="1"/>
+          </p:cNvSpPr>
+          <p:nvPr>
+            <p:ph type="body" idx="1"/>
+          </p:nvPr>
+        </p:nvSpPr>
+        <p:spPr/>
+        <p:txBody>
+          <a:bodyPr/>
+          <a:lstStyle/>
+          <a:p>
+            <a:endParaRPr lang="en-US"/>
+          </a:p>
+        </p:txBody>
+      </p:sp>
+      <p:sp>
+        <p:nvSpPr>
+          <p:cNvPr id="4" name="Slide Number Placeholder 3"/>
+          <p:cNvSpPr>
+            <a:spLocks noGrp="1"/>
+          </p:cNvSpPr>
+          <p:nvPr>
+            <p:ph type="sldNum" sz="quarter" idx="10"/>
+          </p:nvPr>
+        </p:nvSpPr>
+        <p:spPr/>
+        <p:txBody>
+          <a:bodyPr/>
+          <a:lstStyle/>
+          <a:p>
+            <a:fld id="{5394DE12-7B9B-46AA-AC19-C30A49928B9B}" type="slidenum">
+              <a:rPr lang="en-US" smtClean="0"/>
+              <a:t>39</a:t>
             </a:fld>
             <a:endParaRPr lang="en-US"/>
           </a:p>
@@ -4707,7 +5073,7 @@
           <a:p>
             <a:fld id="{969F32F5-AB1C-41B2-AE79-C9DE1D1745A4}" type="datetimeFigureOut">
               <a:rPr lang="en-US" smtClean="0"/>
-              <a:t>4/1/2017</a:t>
+              <a:t>4/4/2017</a:t>
             </a:fld>
             <a:endParaRPr lang="en-US"/>
           </a:p>
@@ -4875,7 +5241,7 @@
           <a:p>
             <a:fld id="{969F32F5-AB1C-41B2-AE79-C9DE1D1745A4}" type="datetimeFigureOut">
               <a:rPr lang="en-US" smtClean="0"/>
-              <a:t>4/1/2017</a:t>
+              <a:t>4/4/2017</a:t>
             </a:fld>
             <a:endParaRPr lang="en-US"/>
           </a:p>
@@ -5053,7 +5419,7 @@
           <a:p>
             <a:fld id="{969F32F5-AB1C-41B2-AE79-C9DE1D1745A4}" type="datetimeFigureOut">
               <a:rPr lang="en-US" smtClean="0"/>
-              <a:t>4/1/2017</a:t>
+              <a:t>4/4/2017</a:t>
             </a:fld>
             <a:endParaRPr lang="en-US"/>
           </a:p>
@@ -5221,7 +5587,7 @@
           <a:p>
             <a:fld id="{969F32F5-AB1C-41B2-AE79-C9DE1D1745A4}" type="datetimeFigureOut">
               <a:rPr lang="en-US" smtClean="0"/>
-              <a:t>4/1/2017</a:t>
+              <a:t>4/4/2017</a:t>
             </a:fld>
             <a:endParaRPr lang="en-US"/>
           </a:p>
@@ -5466,7 +5832,7 @@
           <a:p>
             <a:fld id="{969F32F5-AB1C-41B2-AE79-C9DE1D1745A4}" type="datetimeFigureOut">
               <a:rPr lang="en-US" smtClean="0"/>
-              <a:t>4/1/2017</a:t>
+              <a:t>4/4/2017</a:t>
             </a:fld>
             <a:endParaRPr lang="en-US"/>
           </a:p>
@@ -5695,7 +6061,7 @@
           <a:p>
             <a:fld id="{969F32F5-AB1C-41B2-AE79-C9DE1D1745A4}" type="datetimeFigureOut">
               <a:rPr lang="en-US" smtClean="0"/>
-              <a:t>4/1/2017</a:t>
+              <a:t>4/4/2017</a:t>
             </a:fld>
             <a:endParaRPr lang="en-US"/>
           </a:p>
@@ -6059,7 +6425,7 @@
           <a:p>
             <a:fld id="{969F32F5-AB1C-41B2-AE79-C9DE1D1745A4}" type="datetimeFigureOut">
               <a:rPr lang="en-US" smtClean="0"/>
-              <a:t>4/1/2017</a:t>
+              <a:t>4/4/2017</a:t>
             </a:fld>
             <a:endParaRPr lang="en-US"/>
           </a:p>
@@ -6176,7 +6542,7 @@
           <a:p>
             <a:fld id="{969F32F5-AB1C-41B2-AE79-C9DE1D1745A4}" type="datetimeFigureOut">
               <a:rPr lang="en-US" smtClean="0"/>
-              <a:t>4/1/2017</a:t>
+              <a:t>4/4/2017</a:t>
             </a:fld>
             <a:endParaRPr lang="en-US"/>
           </a:p>
@@ -6271,7 +6637,7 @@
           <a:p>
             <a:fld id="{969F32F5-AB1C-41B2-AE79-C9DE1D1745A4}" type="datetimeFigureOut">
               <a:rPr lang="en-US" smtClean="0"/>
-              <a:t>4/1/2017</a:t>
+              <a:t>4/4/2017</a:t>
             </a:fld>
             <a:endParaRPr lang="en-US"/>
           </a:p>
@@ -6546,7 +6912,7 @@
           <a:p>
             <a:fld id="{969F32F5-AB1C-41B2-AE79-C9DE1D1745A4}" type="datetimeFigureOut">
               <a:rPr lang="en-US" smtClean="0"/>
-              <a:t>4/1/2017</a:t>
+              <a:t>4/4/2017</a:t>
             </a:fld>
             <a:endParaRPr lang="en-US"/>
           </a:p>
@@ -6798,7 +7164,7 @@
           <a:p>
             <a:fld id="{969F32F5-AB1C-41B2-AE79-C9DE1D1745A4}" type="datetimeFigureOut">
               <a:rPr lang="en-US" smtClean="0"/>
-              <a:t>4/1/2017</a:t>
+              <a:t>4/4/2017</a:t>
             </a:fld>
             <a:endParaRPr lang="en-US"/>
           </a:p>
@@ -7009,7 +7375,7 @@
           <a:p>
             <a:fld id="{969F32F5-AB1C-41B2-AE79-C9DE1D1745A4}" type="datetimeFigureOut">
               <a:rPr lang="en-US" smtClean="0"/>
-              <a:t>4/1/2017</a:t>
+              <a:t>4/4/2017</a:t>
             </a:fld>
             <a:endParaRPr lang="en-US"/>
           </a:p>
@@ -10972,7 +11338,7 @@
             </a:pPr>
             <a:r>
               <a:rPr lang="en-US" sz="2000" dirty="0"/>
-              <a:t>Review where we left off is session 1</a:t>
+              <a:t>Review where we left off after sessions 1 and 2… and what to expect in session 4</a:t>
             </a:r>
           </a:p>
           <a:p>
@@ -10982,7 +11348,7 @@
             </a:pPr>
             <a:r>
               <a:rPr lang="en-US" sz="2000" dirty="0"/>
-              <a:t>Identify the goal of session 2</a:t>
+              <a:t>Graphics Object and drawing and Layout Manager review</a:t>
             </a:r>
           </a:p>
           <a:p>
@@ -10992,11 +11358,11 @@
             </a:pPr>
             <a:r>
               <a:rPr lang="en-US" sz="2000" dirty="0"/>
-              <a:t>Implement </a:t>
+              <a:t>Update </a:t>
             </a:r>
             <a:r>
               <a:rPr lang="en-US" sz="2000" dirty="0" err="1"/>
-              <a:t>ShapesLibrary.class</a:t>
+              <a:t>ShapesLibrary</a:t>
             </a:r>
             <a:r>
               <a:rPr lang="en-US" sz="2000" dirty="0"/>
@@ -11010,8 +11376,58 @@
             </a:pPr>
             <a:r>
               <a:rPr lang="en-US" sz="2000" dirty="0"/>
-              <a:t>Get ready for Graphics drawing session</a:t>
-            </a:r>
+              <a:t>Implement </a:t>
+            </a:r>
+            <a:r>
+              <a:rPr lang="en-US" sz="2000" dirty="0" err="1"/>
+              <a:t>ShapeDraw</a:t>
+            </a:r>
+            <a:r>
+              <a:rPr lang="en-US" sz="2000" dirty="0"/>
+              <a:t> application</a:t>
+            </a:r>
+          </a:p>
+          <a:p>
+            <a:pPr marL="457200" indent="-457200">
+              <a:buFont typeface="+mj-lt"/>
+              <a:buAutoNum type="arabicPeriod"/>
+            </a:pPr>
+            <a:r>
+              <a:rPr lang="en-US" sz="2000" dirty="0"/>
+              <a:t>Possible next steps for implementing </a:t>
+            </a:r>
+            <a:r>
+              <a:rPr lang="en-US" sz="2000" dirty="0" err="1"/>
+              <a:t>FaceDraw</a:t>
+            </a:r>
+            <a:endParaRPr lang="en-US" sz="2000" dirty="0"/>
+          </a:p>
+          <a:p>
+            <a:pPr marL="457200" indent="-457200">
+              <a:buFont typeface="+mj-lt"/>
+              <a:buAutoNum type="arabicPeriod"/>
+            </a:pPr>
+            <a:r>
+              <a:rPr lang="en-US" sz="2000" dirty="0"/>
+              <a:t>Questions &amp; Answers</a:t>
+            </a:r>
+          </a:p>
+          <a:p>
+            <a:pPr marL="457200" indent="-457200">
+              <a:buFont typeface="+mj-lt"/>
+              <a:buAutoNum type="arabicPeriod"/>
+            </a:pPr>
+            <a:r>
+              <a:rPr lang="en-US" sz="2000" dirty="0"/>
+              <a:t>Closing Comments</a:t>
+            </a:r>
+          </a:p>
+          <a:p>
+            <a:pPr marL="457200" indent="-457200">
+              <a:buFont typeface="+mj-lt"/>
+              <a:buAutoNum type="arabicPeriod"/>
+            </a:pPr>
+            <a:endParaRPr lang="en-US" sz="2000" dirty="0"/>
           </a:p>
         </p:txBody>
       </p:sp>
@@ -11480,6 +11896,514 @@
           <a:chExt cx="0" cy="0"/>
         </a:xfrm>
       </p:grpSpPr>
+      <p:sp>
+        <p:nvSpPr>
+          <p:cNvPr id="2" name="Title 1"/>
+          <p:cNvSpPr>
+            <a:spLocks noGrp="1"/>
+          </p:cNvSpPr>
+          <p:nvPr>
+            <p:ph type="title"/>
+          </p:nvPr>
+        </p:nvSpPr>
+        <p:spPr/>
+        <p:txBody>
+          <a:bodyPr>
+            <a:normAutofit/>
+          </a:bodyPr>
+          <a:lstStyle/>
+          <a:p>
+            <a:r>
+              <a:rPr lang="en-US" sz="3600" dirty="0"/>
+              <a:t>Layout Managers (continued)</a:t>
+            </a:r>
+          </a:p>
+        </p:txBody>
+      </p:sp>
+      <p:sp>
+        <p:nvSpPr>
+          <p:cNvPr id="3" name="Content Placeholder 2"/>
+          <p:cNvSpPr>
+            <a:spLocks noGrp="1"/>
+          </p:cNvSpPr>
+          <p:nvPr>
+            <p:ph idx="1"/>
+          </p:nvPr>
+        </p:nvSpPr>
+        <p:spPr>
+          <a:xfrm>
+            <a:off x="838198" y="1525772"/>
+            <a:ext cx="10515601" cy="4651191"/>
+          </a:xfrm>
+        </p:spPr>
+        <p:txBody>
+          <a:bodyPr>
+            <a:normAutofit/>
+          </a:bodyPr>
+          <a:lstStyle/>
+          <a:p>
+            <a:pPr marL="0" indent="0">
+              <a:buNone/>
+            </a:pPr>
+            <a:r>
+              <a:rPr lang="en-US" sz="2000" dirty="0"/>
+              <a:t>Layout Managers arrange controls on the screen so they are visually appealing. We will be focusing on three very common Layout Managers: </a:t>
+            </a:r>
+          </a:p>
+          <a:p>
+            <a:r>
+              <a:rPr lang="en-US" sz="2000" dirty="0" err="1"/>
+              <a:t>FlowLayout</a:t>
+            </a:r>
+            <a:r>
+              <a:rPr lang="en-US" sz="2000" dirty="0"/>
+              <a:t>: Arranges components left to right, top to bottom. When a </a:t>
+            </a:r>
+            <a:r>
+              <a:rPr lang="en-US" sz="2000" dirty="0" err="1"/>
+              <a:t>FlowLayout</a:t>
+            </a:r>
+            <a:r>
+              <a:rPr lang="en-US" sz="2000" dirty="0"/>
+              <a:t> runs out of room horizontally on a row, it places the next component as far left as it can go on the row below.</a:t>
+            </a:r>
+          </a:p>
+          <a:p>
+            <a:r>
+              <a:rPr lang="en-US" sz="2000" dirty="0" err="1"/>
+              <a:t>BorderLayout</a:t>
+            </a:r>
+            <a:r>
+              <a:rPr lang="en-US" sz="2000" dirty="0"/>
+              <a:t>: Arranges components in NORTH, SOUTH, EAST, WEST, and CENTER sections.</a:t>
+            </a:r>
+          </a:p>
+          <a:p>
+            <a:r>
+              <a:rPr lang="en-US" sz="2000" dirty="0" err="1"/>
+              <a:t>GridLayout</a:t>
+            </a:r>
+            <a:r>
+              <a:rPr lang="en-US" sz="2000" dirty="0"/>
+              <a:t>: Arranges components in an Excel-like table of rows and columns.</a:t>
+            </a:r>
+          </a:p>
+          <a:p>
+            <a:pPr marL="0" indent="0">
+              <a:buNone/>
+            </a:pPr>
+            <a:endParaRPr lang="en-US" sz="2000" dirty="0"/>
+          </a:p>
+          <a:p>
+            <a:endParaRPr lang="en-US" sz="2000" dirty="0"/>
+          </a:p>
+        </p:txBody>
+      </p:sp>
+      <p:pic>
+        <p:nvPicPr>
+          <p:cNvPr id="4" name="Picture 3"/>
+          <p:cNvPicPr>
+            <a:picLocks noChangeAspect="1"/>
+          </p:cNvPicPr>
+          <p:nvPr/>
+        </p:nvPicPr>
+        <p:blipFill>
+          <a:blip r:embed="rId3"/>
+          <a:stretch>
+            <a:fillRect/>
+          </a:stretch>
+        </p:blipFill>
+        <p:spPr>
+          <a:xfrm>
+            <a:off x="1833562" y="4767248"/>
+            <a:ext cx="3934600" cy="1506172"/>
+          </a:xfrm>
+          <a:prstGeom prst="rect">
+            <a:avLst/>
+          </a:prstGeom>
+        </p:spPr>
+      </p:pic>
+      <p:pic>
+        <p:nvPicPr>
+          <p:cNvPr id="5" name="Picture 4"/>
+          <p:cNvPicPr>
+            <a:picLocks noChangeAspect="1"/>
+          </p:cNvPicPr>
+          <p:nvPr/>
+        </p:nvPicPr>
+        <p:blipFill>
+          <a:blip r:embed="rId4"/>
+          <a:stretch>
+            <a:fillRect/>
+          </a:stretch>
+        </p:blipFill>
+        <p:spPr>
+          <a:xfrm>
+            <a:off x="1094322" y="4003529"/>
+            <a:ext cx="4333599" cy="641102"/>
+          </a:xfrm>
+          <a:prstGeom prst="rect">
+            <a:avLst/>
+          </a:prstGeom>
+        </p:spPr>
+      </p:pic>
+      <p:pic>
+        <p:nvPicPr>
+          <p:cNvPr id="6" name="Picture 5"/>
+          <p:cNvPicPr>
+            <a:picLocks noChangeAspect="1"/>
+          </p:cNvPicPr>
+          <p:nvPr/>
+        </p:nvPicPr>
+        <p:blipFill>
+          <a:blip r:embed="rId5"/>
+          <a:stretch>
+            <a:fillRect/>
+          </a:stretch>
+        </p:blipFill>
+        <p:spPr>
+          <a:xfrm>
+            <a:off x="6181440" y="4003529"/>
+            <a:ext cx="2749632" cy="1814306"/>
+          </a:xfrm>
+          <a:prstGeom prst="rect">
+            <a:avLst/>
+          </a:prstGeom>
+        </p:spPr>
+      </p:pic>
+    </p:spTree>
+    <p:extLst>
+      <p:ext uri="{BB962C8B-B14F-4D97-AF65-F5344CB8AC3E}">
+        <p14:creationId xmlns:p14="http://schemas.microsoft.com/office/powerpoint/2010/main" val="671458879"/>
+      </p:ext>
+    </p:extLst>
+  </p:cSld>
+  <p:clrMapOvr>
+    <a:masterClrMapping/>
+  </p:clrMapOvr>
+  <p:timing>
+    <p:tnLst>
+      <p:par>
+        <p:cTn id="1" dur="indefinite" restart="never" nodeType="tmRoot">
+          <p:childTnLst>
+            <p:seq concurrent="1" nextAc="seek">
+              <p:cTn id="2" dur="indefinite" nodeType="mainSeq">
+                <p:childTnLst>
+                  <p:par>
+                    <p:cTn id="3" fill="hold">
+                      <p:stCondLst>
+                        <p:cond delay="indefinite"/>
+                      </p:stCondLst>
+                      <p:childTnLst>
+                        <p:par>
+                          <p:cTn id="4" fill="hold">
+                            <p:stCondLst>
+                              <p:cond delay="0"/>
+                            </p:stCondLst>
+                            <p:childTnLst>
+                              <p:par>
+                                <p:cTn id="5" presetID="2" presetClass="entr" presetSubtype="4" fill="hold" nodeType="clickEffect">
+                                  <p:stCondLst>
+                                    <p:cond delay="0"/>
+                                  </p:stCondLst>
+                                  <p:childTnLst>
+                                    <p:set>
+                                      <p:cBhvr>
+                                        <p:cTn id="6" dur="1" fill="hold">
+                                          <p:stCondLst>
+                                            <p:cond delay="0"/>
+                                          </p:stCondLst>
+                                        </p:cTn>
+                                        <p:tgtEl>
+                                          <p:spTgt spid="5"/>
+                                        </p:tgtEl>
+                                        <p:attrNameLst>
+                                          <p:attrName>style.visibility</p:attrName>
+                                        </p:attrNameLst>
+                                      </p:cBhvr>
+                                      <p:to>
+                                        <p:strVal val="visible"/>
+                                      </p:to>
+                                    </p:set>
+                                    <p:anim calcmode="lin" valueType="num">
+                                      <p:cBhvr additive="base">
+                                        <p:cTn id="7" dur="500" fill="hold"/>
+                                        <p:tgtEl>
+                                          <p:spTgt spid="5"/>
+                                        </p:tgtEl>
+                                        <p:attrNameLst>
+                                          <p:attrName>ppt_x</p:attrName>
+                                        </p:attrNameLst>
+                                      </p:cBhvr>
+                                      <p:tavLst>
+                                        <p:tav tm="0">
+                                          <p:val>
+                                            <p:strVal val="#ppt_x"/>
+                                          </p:val>
+                                        </p:tav>
+                                        <p:tav tm="100000">
+                                          <p:val>
+                                            <p:strVal val="#ppt_x"/>
+                                          </p:val>
+                                        </p:tav>
+                                      </p:tavLst>
+                                    </p:anim>
+                                    <p:anim calcmode="lin" valueType="num">
+                                      <p:cBhvr additive="base">
+                                        <p:cTn id="8" dur="500" fill="hold"/>
+                                        <p:tgtEl>
+                                          <p:spTgt spid="5"/>
+                                        </p:tgtEl>
+                                        <p:attrNameLst>
+                                          <p:attrName>ppt_y</p:attrName>
+                                        </p:attrNameLst>
+                                      </p:cBhvr>
+                                      <p:tavLst>
+                                        <p:tav tm="0">
+                                          <p:val>
+                                            <p:strVal val="1+#ppt_h/2"/>
+                                          </p:val>
+                                        </p:tav>
+                                        <p:tav tm="100000">
+                                          <p:val>
+                                            <p:strVal val="#ppt_y"/>
+                                          </p:val>
+                                        </p:tav>
+                                      </p:tavLst>
+                                    </p:anim>
+                                  </p:childTnLst>
+                                </p:cTn>
+                              </p:par>
+                            </p:childTnLst>
+                          </p:cTn>
+                        </p:par>
+                      </p:childTnLst>
+                    </p:cTn>
+                  </p:par>
+                  <p:par>
+                    <p:cTn id="9" fill="hold">
+                      <p:stCondLst>
+                        <p:cond delay="indefinite"/>
+                      </p:stCondLst>
+                      <p:childTnLst>
+                        <p:par>
+                          <p:cTn id="10" fill="hold">
+                            <p:stCondLst>
+                              <p:cond delay="0"/>
+                            </p:stCondLst>
+                            <p:childTnLst>
+                              <p:par>
+                                <p:cTn id="11" presetID="2" presetClass="entr" presetSubtype="4" fill="hold" nodeType="clickEffect">
+                                  <p:stCondLst>
+                                    <p:cond delay="0"/>
+                                  </p:stCondLst>
+                                  <p:childTnLst>
+                                    <p:set>
+                                      <p:cBhvr>
+                                        <p:cTn id="12" dur="1" fill="hold">
+                                          <p:stCondLst>
+                                            <p:cond delay="0"/>
+                                          </p:stCondLst>
+                                        </p:cTn>
+                                        <p:tgtEl>
+                                          <p:spTgt spid="4"/>
+                                        </p:tgtEl>
+                                        <p:attrNameLst>
+                                          <p:attrName>style.visibility</p:attrName>
+                                        </p:attrNameLst>
+                                      </p:cBhvr>
+                                      <p:to>
+                                        <p:strVal val="visible"/>
+                                      </p:to>
+                                    </p:set>
+                                    <p:anim calcmode="lin" valueType="num">
+                                      <p:cBhvr additive="base">
+                                        <p:cTn id="13" dur="500" fill="hold"/>
+                                        <p:tgtEl>
+                                          <p:spTgt spid="4"/>
+                                        </p:tgtEl>
+                                        <p:attrNameLst>
+                                          <p:attrName>ppt_x</p:attrName>
+                                        </p:attrNameLst>
+                                      </p:cBhvr>
+                                      <p:tavLst>
+                                        <p:tav tm="0">
+                                          <p:val>
+                                            <p:strVal val="#ppt_x"/>
+                                          </p:val>
+                                        </p:tav>
+                                        <p:tav tm="100000">
+                                          <p:val>
+                                            <p:strVal val="#ppt_x"/>
+                                          </p:val>
+                                        </p:tav>
+                                      </p:tavLst>
+                                    </p:anim>
+                                    <p:anim calcmode="lin" valueType="num">
+                                      <p:cBhvr additive="base">
+                                        <p:cTn id="14" dur="500" fill="hold"/>
+                                        <p:tgtEl>
+                                          <p:spTgt spid="4"/>
+                                        </p:tgtEl>
+                                        <p:attrNameLst>
+                                          <p:attrName>ppt_y</p:attrName>
+                                        </p:attrNameLst>
+                                      </p:cBhvr>
+                                      <p:tavLst>
+                                        <p:tav tm="0">
+                                          <p:val>
+                                            <p:strVal val="1+#ppt_h/2"/>
+                                          </p:val>
+                                        </p:tav>
+                                        <p:tav tm="100000">
+                                          <p:val>
+                                            <p:strVal val="#ppt_y"/>
+                                          </p:val>
+                                        </p:tav>
+                                      </p:tavLst>
+                                    </p:anim>
+                                  </p:childTnLst>
+                                </p:cTn>
+                              </p:par>
+                            </p:childTnLst>
+                          </p:cTn>
+                        </p:par>
+                      </p:childTnLst>
+                    </p:cTn>
+                  </p:par>
+                  <p:par>
+                    <p:cTn id="15" fill="hold">
+                      <p:stCondLst>
+                        <p:cond delay="indefinite"/>
+                      </p:stCondLst>
+                      <p:childTnLst>
+                        <p:par>
+                          <p:cTn id="16" fill="hold">
+                            <p:stCondLst>
+                              <p:cond delay="0"/>
+                            </p:stCondLst>
+                            <p:childTnLst>
+                              <p:par>
+                                <p:cTn id="17" presetID="2" presetClass="entr" presetSubtype="4" fill="hold" nodeType="clickEffect">
+                                  <p:stCondLst>
+                                    <p:cond delay="0"/>
+                                  </p:stCondLst>
+                                  <p:childTnLst>
+                                    <p:set>
+                                      <p:cBhvr>
+                                        <p:cTn id="18" dur="1" fill="hold">
+                                          <p:stCondLst>
+                                            <p:cond delay="0"/>
+                                          </p:stCondLst>
+                                        </p:cTn>
+                                        <p:tgtEl>
+                                          <p:spTgt spid="6"/>
+                                        </p:tgtEl>
+                                        <p:attrNameLst>
+                                          <p:attrName>style.visibility</p:attrName>
+                                        </p:attrNameLst>
+                                      </p:cBhvr>
+                                      <p:to>
+                                        <p:strVal val="visible"/>
+                                      </p:to>
+                                    </p:set>
+                                    <p:anim calcmode="lin" valueType="num">
+                                      <p:cBhvr additive="base">
+                                        <p:cTn id="19" dur="500" fill="hold"/>
+                                        <p:tgtEl>
+                                          <p:spTgt spid="6"/>
+                                        </p:tgtEl>
+                                        <p:attrNameLst>
+                                          <p:attrName>ppt_x</p:attrName>
+                                        </p:attrNameLst>
+                                      </p:cBhvr>
+                                      <p:tavLst>
+                                        <p:tav tm="0">
+                                          <p:val>
+                                            <p:strVal val="#ppt_x"/>
+                                          </p:val>
+                                        </p:tav>
+                                        <p:tav tm="100000">
+                                          <p:val>
+                                            <p:strVal val="#ppt_x"/>
+                                          </p:val>
+                                        </p:tav>
+                                      </p:tavLst>
+                                    </p:anim>
+                                    <p:anim calcmode="lin" valueType="num">
+                                      <p:cBhvr additive="base">
+                                        <p:cTn id="20" dur="500" fill="hold"/>
+                                        <p:tgtEl>
+                                          <p:spTgt spid="6"/>
+                                        </p:tgtEl>
+                                        <p:attrNameLst>
+                                          <p:attrName>ppt_y</p:attrName>
+                                        </p:attrNameLst>
+                                      </p:cBhvr>
+                                      <p:tavLst>
+                                        <p:tav tm="0">
+                                          <p:val>
+                                            <p:strVal val="1+#ppt_h/2"/>
+                                          </p:val>
+                                        </p:tav>
+                                        <p:tav tm="100000">
+                                          <p:val>
+                                            <p:strVal val="#ppt_y"/>
+                                          </p:val>
+                                        </p:tav>
+                                      </p:tavLst>
+                                    </p:anim>
+                                  </p:childTnLst>
+                                </p:cTn>
+                              </p:par>
+                            </p:childTnLst>
+                          </p:cTn>
+                        </p:par>
+                      </p:childTnLst>
+                    </p:cTn>
+                  </p:par>
+                </p:childTnLst>
+              </p:cTn>
+              <p:prevCondLst>
+                <p:cond evt="onPrev" delay="0">
+                  <p:tgtEl>
+                    <p:sldTgt/>
+                  </p:tgtEl>
+                </p:cond>
+              </p:prevCondLst>
+              <p:nextCondLst>
+                <p:cond evt="onNext" delay="0">
+                  <p:tgtEl>
+                    <p:sldTgt/>
+                  </p:tgtEl>
+                </p:cond>
+              </p:nextCondLst>
+            </p:seq>
+          </p:childTnLst>
+        </p:cTn>
+      </p:par>
+    </p:tnLst>
+  </p:timing>
+</p:sld>
+</file>
+
+<file path=ppt/slides/slide28.xml><?xml version="1.0" encoding="utf-8"?>
+<p:sld xmlns:a="http://schemas.openxmlformats.org/drawingml/2006/main" xmlns:r="http://schemas.openxmlformats.org/officeDocument/2006/relationships" xmlns:p="http://schemas.openxmlformats.org/presentationml/2006/main">
+  <p:cSld>
+    <p:spTree>
+      <p:nvGrpSpPr>
+        <p:cNvPr id="1" name=""/>
+        <p:cNvGrpSpPr/>
+        <p:nvPr/>
+      </p:nvGrpSpPr>
+      <p:grpSpPr>
+        <a:xfrm>
+          <a:off x="0" y="0"/>
+          <a:ext cx="0" cy="0"/>
+          <a:chOff x="0" y="0"/>
+          <a:chExt cx="0" cy="0"/>
+        </a:xfrm>
+      </p:grpSpPr>
       <p:pic>
         <p:nvPicPr>
           <p:cNvPr id="5" name="Picture 4"/>
@@ -11706,7 +12630,7 @@
 </p:sld>
 </file>
 
-<file path=ppt/slides/slide28.xml><?xml version="1.0" encoding="utf-8"?>
+<file path=ppt/slides/slide29.xml><?xml version="1.0" encoding="utf-8"?>
 <p:sld xmlns:a="http://schemas.openxmlformats.org/drawingml/2006/main" xmlns:r="http://schemas.openxmlformats.org/officeDocument/2006/relationships" xmlns:p="http://schemas.openxmlformats.org/presentationml/2006/main">
   <p:cSld>
     <p:spTree>
@@ -11757,15 +12681,217 @@
             <p:ph idx="1"/>
           </p:nvPr>
         </p:nvSpPr>
-        <p:spPr/>
-        <p:txBody>
-          <a:bodyPr/>
-          <a:lstStyle/>
-          <a:p>
-            <a:endParaRPr lang="en-US"/>
-          </a:p>
-        </p:txBody>
-      </p:sp>
+        <p:spPr>
+          <a:xfrm>
+            <a:off x="838200" y="1458802"/>
+            <a:ext cx="10515600" cy="4351338"/>
+          </a:xfrm>
+        </p:spPr>
+        <p:txBody>
+          <a:bodyPr>
+            <a:normAutofit/>
+          </a:bodyPr>
+          <a:lstStyle/>
+          <a:p>
+            <a:pPr marL="0" indent="0">
+              <a:buNone/>
+            </a:pPr>
+            <a:r>
+              <a:rPr lang="en-US" sz="2000" dirty="0"/>
+              <a:t>Our Discussion &amp; Lecture Session will be focuses on giving you some insights in methods you may want to use in implementing </a:t>
+            </a:r>
+            <a:r>
+              <a:rPr lang="en-US" sz="2000" dirty="0" err="1"/>
+              <a:t>FaceDraw</a:t>
+            </a:r>
+            <a:r>
+              <a:rPr lang="en-US" sz="2000" dirty="0"/>
+              <a:t> including:</a:t>
+            </a:r>
+          </a:p>
+          <a:p>
+            <a:pPr marL="457200" indent="-457200">
+              <a:buFont typeface="+mj-lt"/>
+              <a:buAutoNum type="arabicPeriod"/>
+            </a:pPr>
+            <a:r>
+              <a:rPr lang="en-US" sz="2000" dirty="0"/>
+              <a:t>Update </a:t>
+            </a:r>
+            <a:r>
+              <a:rPr lang="en-US" sz="2000" dirty="0" err="1"/>
+              <a:t>ShapesLibrary</a:t>
+            </a:r>
+            <a:r>
+              <a:rPr lang="en-US" sz="2000" dirty="0"/>
+              <a:t> to:</a:t>
+            </a:r>
+          </a:p>
+          <a:p>
+            <a:pPr lvl="1"/>
+            <a:r>
+              <a:rPr lang="en-US" sz="1600" dirty="0"/>
+              <a:t>Include width &amp; height in the base Shapes class so that we can use them Polymorphically</a:t>
+            </a:r>
+          </a:p>
+          <a:p>
+            <a:pPr lvl="1"/>
+            <a:r>
+              <a:rPr lang="en-US" sz="1600" dirty="0"/>
+              <a:t>Define the specifics for position x &amp; y… lower left corner of shape</a:t>
+            </a:r>
+          </a:p>
+          <a:p>
+            <a:pPr lvl="1"/>
+            <a:r>
+              <a:rPr lang="en-US" sz="1600" dirty="0"/>
+              <a:t>Updating Circle so that it utilizes width &amp; height instead of radius</a:t>
+            </a:r>
+          </a:p>
+          <a:p>
+            <a:pPr lvl="1"/>
+            <a:r>
+              <a:rPr lang="en-US" sz="1600" dirty="0"/>
+              <a:t>Create Oval which can now more easily be descended from Circle</a:t>
+            </a:r>
+          </a:p>
+          <a:p>
+            <a:pPr marL="457200" indent="-457200">
+              <a:buFont typeface="+mj-lt"/>
+              <a:buAutoNum type="arabicPeriod"/>
+            </a:pPr>
+            <a:r>
+              <a:rPr lang="en-US" sz="2000" dirty="0"/>
+              <a:t>Create a new </a:t>
+            </a:r>
+            <a:r>
+              <a:rPr lang="en-US" sz="2000" dirty="0" err="1"/>
+              <a:t>ShapeDraw</a:t>
+            </a:r>
+            <a:r>
+              <a:rPr lang="en-US" sz="2000" dirty="0"/>
+              <a:t> application that will leverage the new Oval class from </a:t>
+            </a:r>
+            <a:r>
+              <a:rPr lang="en-US" sz="2000" dirty="0" err="1"/>
+              <a:t>ShapesLibrary</a:t>
+            </a:r>
+            <a:endParaRPr lang="en-US" sz="2000" dirty="0"/>
+          </a:p>
+          <a:p>
+            <a:pPr marL="457200" indent="-457200">
+              <a:buFont typeface="+mj-lt"/>
+              <a:buAutoNum type="arabicPeriod"/>
+            </a:pPr>
+            <a:r>
+              <a:rPr lang="en-US" sz="2000" dirty="0"/>
+              <a:t>Create </a:t>
+            </a:r>
+            <a:r>
+              <a:rPr lang="en-US" sz="2000" dirty="0" err="1"/>
+              <a:t>OvalDraw</a:t>
+            </a:r>
+            <a:r>
+              <a:rPr lang="en-US" sz="2000" dirty="0"/>
+              <a:t> application</a:t>
+            </a:r>
+          </a:p>
+          <a:p>
+            <a:pPr marL="457200" indent="-457200">
+              <a:buFont typeface="+mj-lt"/>
+              <a:buAutoNum type="arabicPeriod"/>
+            </a:pPr>
+            <a:r>
+              <a:rPr lang="en-US" sz="2000" dirty="0"/>
+              <a:t>Implement </a:t>
+            </a:r>
+            <a:r>
+              <a:rPr lang="en-US" sz="2000" dirty="0" err="1"/>
+              <a:t>JFrames</a:t>
+            </a:r>
+            <a:r>
+              <a:rPr lang="en-US" sz="2000" dirty="0"/>
+              <a:t>, </a:t>
+            </a:r>
+            <a:r>
+              <a:rPr lang="en-US" sz="2000" dirty="0" err="1"/>
+              <a:t>JPanels</a:t>
+            </a:r>
+            <a:r>
+              <a:rPr lang="en-US" sz="2000" dirty="0"/>
+              <a:t>, and </a:t>
+            </a:r>
+            <a:r>
+              <a:rPr lang="en-US" sz="2000" dirty="0" err="1"/>
+              <a:t>ArrayLists</a:t>
+            </a:r>
+            <a:endParaRPr lang="en-US" sz="2000" dirty="0"/>
+          </a:p>
+          <a:p>
+            <a:pPr marL="457200" indent="-457200">
+              <a:buFont typeface="+mj-lt"/>
+              <a:buAutoNum type="arabicPeriod"/>
+            </a:pPr>
+            <a:r>
+              <a:rPr lang="en-US" sz="2000" dirty="0"/>
+              <a:t>Add new code to GitHub</a:t>
+            </a:r>
+          </a:p>
+          <a:p>
+            <a:pPr marL="457200" indent="-457200">
+              <a:buFont typeface="+mj-lt"/>
+              <a:buAutoNum type="arabicPeriod"/>
+            </a:pPr>
+            <a:r>
+              <a:rPr lang="en-US" sz="2000" dirty="0"/>
+              <a:t>Discuss how you might enhance </a:t>
+            </a:r>
+            <a:r>
+              <a:rPr lang="en-US" sz="2000" dirty="0" err="1"/>
+              <a:t>OvalDraw</a:t>
+            </a:r>
+            <a:r>
+              <a:rPr lang="en-US" sz="2000" dirty="0"/>
+              <a:t> to </a:t>
+            </a:r>
+            <a:r>
+              <a:rPr lang="en-US" sz="2000" dirty="0" err="1"/>
+              <a:t>FaceDraw</a:t>
+            </a:r>
+            <a:endParaRPr lang="en-US" sz="2000" dirty="0"/>
+          </a:p>
+          <a:p>
+            <a:pPr marL="0" indent="0">
+              <a:buNone/>
+            </a:pPr>
+            <a:endParaRPr lang="en-US" sz="2000" dirty="0"/>
+          </a:p>
+        </p:txBody>
+      </p:sp>
+      <p:pic>
+        <p:nvPicPr>
+          <p:cNvPr id="4" name="Picture 3"/>
+          <p:cNvPicPr>
+            <a:picLocks noChangeAspect="1"/>
+          </p:cNvPicPr>
+          <p:nvPr/>
+        </p:nvPicPr>
+        <p:blipFill>
+          <a:blip r:embed="rId3"/>
+          <a:stretch>
+            <a:fillRect/>
+          </a:stretch>
+        </p:blipFill>
+        <p:spPr>
+          <a:xfrm>
+            <a:off x="8005651" y="3995295"/>
+            <a:ext cx="3902813" cy="2626634"/>
+          </a:xfrm>
+          <a:prstGeom prst="rect">
+            <a:avLst/>
+          </a:prstGeom>
+        </p:spPr>
+      </p:pic>
     </p:spTree>
     <p:extLst>
       <p:ext uri="{BB962C8B-B14F-4D97-AF65-F5344CB8AC3E}">
@@ -11776,10 +12902,479 @@
   <p:clrMapOvr>
     <a:masterClrMapping/>
   </p:clrMapOvr>
+  <p:timing>
+    <p:tnLst>
+      <p:par>
+        <p:cTn id="1" dur="indefinite" restart="never" nodeType="tmRoot">
+          <p:childTnLst>
+            <p:seq concurrent="1" nextAc="seek">
+              <p:cTn id="2" dur="indefinite" nodeType="mainSeq">
+                <p:childTnLst>
+                  <p:par>
+                    <p:cTn id="3" fill="hold">
+                      <p:stCondLst>
+                        <p:cond delay="indefinite"/>
+                      </p:stCondLst>
+                      <p:childTnLst>
+                        <p:par>
+                          <p:cTn id="4" fill="hold">
+                            <p:stCondLst>
+                              <p:cond delay="0"/>
+                            </p:stCondLst>
+                            <p:childTnLst>
+                              <p:par>
+                                <p:cTn id="5" presetID="2" presetClass="entr" presetSubtype="4" fill="hold" nodeType="clickEffect">
+                                  <p:stCondLst>
+                                    <p:cond delay="0"/>
+                                  </p:stCondLst>
+                                  <p:childTnLst>
+                                    <p:set>
+                                      <p:cBhvr>
+                                        <p:cTn id="6" dur="1" fill="hold">
+                                          <p:stCondLst>
+                                            <p:cond delay="0"/>
+                                          </p:stCondLst>
+                                        </p:cTn>
+                                        <p:tgtEl>
+                                          <p:spTgt spid="4"/>
+                                        </p:tgtEl>
+                                        <p:attrNameLst>
+                                          <p:attrName>style.visibility</p:attrName>
+                                        </p:attrNameLst>
+                                      </p:cBhvr>
+                                      <p:to>
+                                        <p:strVal val="visible"/>
+                                      </p:to>
+                                    </p:set>
+                                    <p:anim calcmode="lin" valueType="num">
+                                      <p:cBhvr additive="base">
+                                        <p:cTn id="7" dur="500" fill="hold"/>
+                                        <p:tgtEl>
+                                          <p:spTgt spid="4"/>
+                                        </p:tgtEl>
+                                        <p:attrNameLst>
+                                          <p:attrName>ppt_x</p:attrName>
+                                        </p:attrNameLst>
+                                      </p:cBhvr>
+                                      <p:tavLst>
+                                        <p:tav tm="0">
+                                          <p:val>
+                                            <p:strVal val="#ppt_x"/>
+                                          </p:val>
+                                        </p:tav>
+                                        <p:tav tm="100000">
+                                          <p:val>
+                                            <p:strVal val="#ppt_x"/>
+                                          </p:val>
+                                        </p:tav>
+                                      </p:tavLst>
+                                    </p:anim>
+                                    <p:anim calcmode="lin" valueType="num">
+                                      <p:cBhvr additive="base">
+                                        <p:cTn id="8" dur="500" fill="hold"/>
+                                        <p:tgtEl>
+                                          <p:spTgt spid="4"/>
+                                        </p:tgtEl>
+                                        <p:attrNameLst>
+                                          <p:attrName>ppt_y</p:attrName>
+                                        </p:attrNameLst>
+                                      </p:cBhvr>
+                                      <p:tavLst>
+                                        <p:tav tm="0">
+                                          <p:val>
+                                            <p:strVal val="1+#ppt_h/2"/>
+                                          </p:val>
+                                        </p:tav>
+                                        <p:tav tm="100000">
+                                          <p:val>
+                                            <p:strVal val="#ppt_y"/>
+                                          </p:val>
+                                        </p:tav>
+                                      </p:tavLst>
+                                    </p:anim>
+                                  </p:childTnLst>
+                                </p:cTn>
+                              </p:par>
+                            </p:childTnLst>
+                          </p:cTn>
+                        </p:par>
+                      </p:childTnLst>
+                    </p:cTn>
+                  </p:par>
+                </p:childTnLst>
+              </p:cTn>
+              <p:prevCondLst>
+                <p:cond evt="onPrev" delay="0">
+                  <p:tgtEl>
+                    <p:sldTgt/>
+                  </p:tgtEl>
+                </p:cond>
+              </p:prevCondLst>
+              <p:nextCondLst>
+                <p:cond evt="onNext" delay="0">
+                  <p:tgtEl>
+                    <p:sldTgt/>
+                  </p:tgtEl>
+                </p:cond>
+              </p:nextCondLst>
+            </p:seq>
+          </p:childTnLst>
+        </p:cTn>
+      </p:par>
+    </p:tnLst>
+  </p:timing>
 </p:sld>
 </file>
 
-<file path=ppt/slides/slide29.xml><?xml version="1.0" encoding="utf-8"?>
+<file path=ppt/slides/slide3.xml><?xml version="1.0" encoding="utf-8"?>
+<p:sld xmlns:a="http://schemas.openxmlformats.org/drawingml/2006/main" xmlns:r="http://schemas.openxmlformats.org/officeDocument/2006/relationships" xmlns:p="http://schemas.openxmlformats.org/presentationml/2006/main">
+  <p:cSld>
+    <p:spTree>
+      <p:nvGrpSpPr>
+        <p:cNvPr id="1" name=""/>
+        <p:cNvGrpSpPr/>
+        <p:nvPr/>
+      </p:nvGrpSpPr>
+      <p:grpSpPr>
+        <a:xfrm>
+          <a:off x="0" y="0"/>
+          <a:ext cx="0" cy="0"/>
+          <a:chOff x="0" y="0"/>
+          <a:chExt cx="0" cy="0"/>
+        </a:xfrm>
+      </p:grpSpPr>
+      <p:sp>
+        <p:nvSpPr>
+          <p:cNvPr id="2" name="Title 1"/>
+          <p:cNvSpPr>
+            <a:spLocks noGrp="1"/>
+          </p:cNvSpPr>
+          <p:nvPr>
+            <p:ph type="title"/>
+          </p:nvPr>
+        </p:nvSpPr>
+        <p:spPr>
+          <a:xfrm>
+            <a:off x="838200" y="365126"/>
+            <a:ext cx="10515600" cy="757272"/>
+          </a:xfrm>
+        </p:spPr>
+        <p:txBody>
+          <a:bodyPr>
+            <a:normAutofit/>
+          </a:bodyPr>
+          <a:lstStyle/>
+          <a:p>
+            <a:r>
+              <a:rPr lang="en-US" sz="3600" dirty="0"/>
+              <a:t>Learning Objectives – Week 3</a:t>
+            </a:r>
+            <a:endParaRPr lang="en-US" sz="3600" b="1" i="1" u="sng" dirty="0"/>
+          </a:p>
+        </p:txBody>
+      </p:sp>
+      <p:sp>
+        <p:nvSpPr>
+          <p:cNvPr id="3" name="Content Placeholder 2"/>
+          <p:cNvSpPr>
+            <a:spLocks noGrp="1"/>
+          </p:cNvSpPr>
+          <p:nvPr>
+            <p:ph idx="1"/>
+          </p:nvPr>
+        </p:nvSpPr>
+        <p:spPr>
+          <a:xfrm>
+            <a:off x="838200" y="1122398"/>
+            <a:ext cx="10718950" cy="5463343"/>
+          </a:xfrm>
+        </p:spPr>
+        <p:txBody>
+          <a:bodyPr>
+            <a:normAutofit/>
+          </a:bodyPr>
+          <a:lstStyle/>
+          <a:p>
+            <a:pPr marL="457200" indent="-457200">
+              <a:buFont typeface="+mj-lt"/>
+              <a:buAutoNum type="arabicPeriod"/>
+            </a:pPr>
+            <a:r>
+              <a:rPr lang="en-US" sz="2000" dirty="0"/>
+              <a:t>Explain the difference between lightweight and heavyweight components</a:t>
+            </a:r>
+          </a:p>
+          <a:p>
+            <a:pPr marL="457200" indent="-457200">
+              <a:buFont typeface="+mj-lt"/>
+              <a:buAutoNum type="arabicPeriod"/>
+            </a:pPr>
+            <a:r>
+              <a:rPr lang="en-US" sz="2000" dirty="0"/>
+              <a:t>Identify lightweight and heavyweight components</a:t>
+            </a:r>
+          </a:p>
+          <a:p>
+            <a:pPr marL="457200" indent="-457200">
+              <a:buFont typeface="+mj-lt"/>
+              <a:buAutoNum type="arabicPeriod"/>
+            </a:pPr>
+            <a:r>
+              <a:rPr lang="en-US" sz="2000" dirty="0"/>
+              <a:t>Describe how lightweight and heavyweight components render themselves</a:t>
+            </a:r>
+          </a:p>
+          <a:p>
+            <a:pPr marL="457200" indent="-457200">
+              <a:buFont typeface="+mj-lt"/>
+              <a:buAutoNum type="arabicPeriod"/>
+            </a:pPr>
+            <a:r>
+              <a:rPr lang="en-US" sz="2000" dirty="0"/>
+              <a:t>Identify layout managers for heavyweight and lightweight components</a:t>
+            </a:r>
+          </a:p>
+          <a:p>
+            <a:pPr marL="457200" indent="-457200">
+              <a:buFont typeface="+mj-lt"/>
+              <a:buAutoNum type="arabicPeriod"/>
+            </a:pPr>
+            <a:r>
+              <a:rPr lang="en-US" sz="2000" dirty="0"/>
+              <a:t>Explain what a layout manager does and identify and describe three of them</a:t>
+            </a:r>
+          </a:p>
+          <a:p>
+            <a:pPr marL="457200" indent="-457200">
+              <a:buFont typeface="+mj-lt"/>
+              <a:buAutoNum type="arabicPeriod"/>
+            </a:pPr>
+            <a:r>
+              <a:rPr lang="en-US" sz="2000" dirty="0"/>
+              <a:t>Explain how to achieve true Model-View-Controller architecture by removing any reference from the view to the model and from the model to the view</a:t>
+            </a:r>
+          </a:p>
+          <a:p>
+            <a:pPr marL="457200" indent="-457200">
+              <a:buFont typeface="+mj-lt"/>
+              <a:buAutoNum type="arabicPeriod"/>
+            </a:pPr>
+            <a:r>
+              <a:rPr lang="en-US" sz="2000" dirty="0"/>
+              <a:t>Distinguish between extending a class and implementing an interface</a:t>
+            </a:r>
+          </a:p>
+          <a:p>
+            <a:pPr marL="457200" indent="-457200">
+              <a:buFont typeface="+mj-lt"/>
+              <a:buAutoNum type="arabicPeriod"/>
+            </a:pPr>
+            <a:r>
+              <a:rPr lang="en-US" sz="2000" dirty="0"/>
+              <a:t>Explain multiple ways to implement an event handler for a particular object and event (anonymous inner classes vs. named classes vs. having the frame itself serve as the handler)</a:t>
+            </a:r>
+          </a:p>
+          <a:p>
+            <a:pPr marL="457200" indent="-457200">
+              <a:buFont typeface="+mj-lt"/>
+              <a:buAutoNum type="arabicPeriod"/>
+            </a:pPr>
+            <a:r>
+              <a:rPr lang="en-US" sz="2000" dirty="0"/>
+              <a:t>Create an event handler that implements the ActionListener interface to respond to the user clicking on a button</a:t>
+            </a:r>
+          </a:p>
+          <a:p>
+            <a:pPr marL="457200" indent="-457200">
+              <a:buFont typeface="+mj-lt"/>
+              <a:buAutoNum type="arabicPeriod"/>
+            </a:pPr>
+            <a:r>
+              <a:rPr lang="en-US" sz="2000" dirty="0"/>
+              <a:t>Use paint and </a:t>
+            </a:r>
+            <a:r>
+              <a:rPr lang="en-US" sz="2000" dirty="0" err="1"/>
+              <a:t>paintComponent's</a:t>
+            </a:r>
+            <a:r>
+              <a:rPr lang="en-US" sz="2000" dirty="0"/>
+              <a:t> Graphics object to draw a variety of shapes</a:t>
+            </a:r>
+          </a:p>
+        </p:txBody>
+      </p:sp>
+    </p:spTree>
+    <p:extLst>
+      <p:ext uri="{BB962C8B-B14F-4D97-AF65-F5344CB8AC3E}">
+        <p14:creationId xmlns:p14="http://schemas.microsoft.com/office/powerpoint/2010/main" val="1072399538"/>
+      </p:ext>
+    </p:extLst>
+  </p:cSld>
+  <p:clrMapOvr>
+    <a:masterClrMapping/>
+  </p:clrMapOvr>
+</p:sld>
+</file>
+
+<file path=ppt/slides/slide30.xml><?xml version="1.0" encoding="utf-8"?>
+<p:sld xmlns:a="http://schemas.openxmlformats.org/drawingml/2006/main" xmlns:r="http://schemas.openxmlformats.org/officeDocument/2006/relationships" xmlns:p="http://schemas.openxmlformats.org/presentationml/2006/main">
+  <p:cSld>
+    <p:spTree>
+      <p:nvGrpSpPr>
+        <p:cNvPr id="1" name=""/>
+        <p:cNvGrpSpPr/>
+        <p:nvPr/>
+      </p:nvGrpSpPr>
+      <p:grpSpPr>
+        <a:xfrm>
+          <a:off x="0" y="0"/>
+          <a:ext cx="0" cy="0"/>
+          <a:chOff x="0" y="0"/>
+          <a:chExt cx="0" cy="0"/>
+        </a:xfrm>
+      </p:grpSpPr>
+      <p:sp>
+        <p:nvSpPr>
+          <p:cNvPr id="2" name="Title 1"/>
+          <p:cNvSpPr>
+            <a:spLocks noGrp="1"/>
+          </p:cNvSpPr>
+          <p:nvPr>
+            <p:ph type="title"/>
+          </p:nvPr>
+        </p:nvSpPr>
+        <p:spPr>
+          <a:xfrm>
+            <a:off x="838200" y="365126"/>
+            <a:ext cx="6113662" cy="1409174"/>
+          </a:xfrm>
+        </p:spPr>
+        <p:txBody>
+          <a:bodyPr>
+            <a:normAutofit/>
+          </a:bodyPr>
+          <a:lstStyle/>
+          <a:p>
+            <a:r>
+              <a:rPr lang="en-US" sz="3600" dirty="0"/>
+              <a:t>Object-Oriented Programming</a:t>
+            </a:r>
+            <a:br>
+              <a:rPr lang="en-US" sz="3600" dirty="0"/>
+            </a:br>
+            <a:r>
+              <a:rPr lang="en-US" sz="1800" dirty="0"/>
+              <a:t>Session: Discussion &amp; Lecture (Week 3 Session 3)</a:t>
+            </a:r>
+            <a:br>
+              <a:rPr lang="en-US" sz="1800" dirty="0"/>
+            </a:br>
+            <a:r>
+              <a:rPr lang="en-US" sz="1800" dirty="0"/>
+              <a:t>Instructor: Eric Pogue</a:t>
+            </a:r>
+            <a:endParaRPr lang="en-US" sz="1800" b="1" i="1" u="sng" dirty="0"/>
+          </a:p>
+        </p:txBody>
+      </p:sp>
+      <p:sp>
+        <p:nvSpPr>
+          <p:cNvPr id="3" name="Content Placeholder 2"/>
+          <p:cNvSpPr>
+            <a:spLocks noGrp="1"/>
+          </p:cNvSpPr>
+          <p:nvPr>
+            <p:ph idx="1"/>
+          </p:nvPr>
+        </p:nvSpPr>
+        <p:spPr>
+          <a:xfrm>
+            <a:off x="838200" y="1943857"/>
+            <a:ext cx="10718950" cy="4571242"/>
+          </a:xfrm>
+        </p:spPr>
+        <p:txBody>
+          <a:bodyPr>
+            <a:noAutofit/>
+          </a:bodyPr>
+          <a:lstStyle/>
+          <a:p>
+            <a:pPr marL="0" indent="0">
+              <a:buNone/>
+            </a:pPr>
+            <a:r>
+              <a:rPr lang="en-US" sz="2000" u="sng" dirty="0"/>
+              <a:t>Closing Comments:</a:t>
+            </a:r>
+          </a:p>
+          <a:p>
+            <a:pPr marL="457200" indent="-457200">
+              <a:buFont typeface="+mj-lt"/>
+              <a:buAutoNum type="arabicPeriod"/>
+            </a:pPr>
+            <a:r>
+              <a:rPr lang="en-US" sz="2000" dirty="0"/>
+              <a:t>Build something that you can take pride in delivering!</a:t>
+            </a:r>
+          </a:p>
+          <a:p>
+            <a:pPr marL="457200" indent="-457200">
+              <a:buFont typeface="+mj-lt"/>
+              <a:buAutoNum type="arabicPeriod"/>
+            </a:pPr>
+            <a:r>
+              <a:rPr lang="en-US" sz="2000" dirty="0"/>
+              <a:t>If you do something special in this assignment, let me know</a:t>
+            </a:r>
+          </a:p>
+          <a:p>
+            <a:pPr marL="457200" indent="-457200">
+              <a:buFont typeface="+mj-lt"/>
+              <a:buAutoNum type="arabicPeriod"/>
+            </a:pPr>
+            <a:endParaRPr lang="en-US" sz="2000" dirty="0"/>
+          </a:p>
+        </p:txBody>
+      </p:sp>
+      <p:pic>
+        <p:nvPicPr>
+          <p:cNvPr id="4" name="Content Placeholder 4"/>
+          <p:cNvPicPr>
+            <a:picLocks noChangeAspect="1"/>
+          </p:cNvPicPr>
+          <p:nvPr/>
+        </p:nvPicPr>
+        <p:blipFill>
+          <a:blip r:embed="rId3"/>
+          <a:stretch>
+            <a:fillRect/>
+          </a:stretch>
+        </p:blipFill>
+        <p:spPr>
+          <a:xfrm>
+            <a:off x="9072894" y="182925"/>
+            <a:ext cx="2656367" cy="1366321"/>
+          </a:xfrm>
+          <a:prstGeom prst="rect">
+            <a:avLst/>
+          </a:prstGeom>
+        </p:spPr>
+      </p:pic>
+    </p:spTree>
+    <p:extLst>
+      <p:ext uri="{BB962C8B-B14F-4D97-AF65-F5344CB8AC3E}">
+        <p14:creationId xmlns:p14="http://schemas.microsoft.com/office/powerpoint/2010/main" val="3656617671"/>
+      </p:ext>
+    </p:extLst>
+  </p:cSld>
+  <p:clrMapOvr>
+    <a:masterClrMapping/>
+  </p:clrMapOvr>
+</p:sld>
+</file>
+
+<file path=ppt/slides/slide31.xml><?xml version="1.0" encoding="utf-8"?>
 <p:sld xmlns:a="http://schemas.openxmlformats.org/drawingml/2006/main" xmlns:r="http://schemas.openxmlformats.org/officeDocument/2006/relationships" xmlns:p="http://schemas.openxmlformats.org/presentationml/2006/main">
   <p:cSld>
     <p:bg>
@@ -11899,198 +13494,7 @@
 </p:sld>
 </file>
 
-<file path=ppt/slides/slide3.xml><?xml version="1.0" encoding="utf-8"?>
-<p:sld xmlns:a="http://schemas.openxmlformats.org/drawingml/2006/main" xmlns:r="http://schemas.openxmlformats.org/officeDocument/2006/relationships" xmlns:p="http://schemas.openxmlformats.org/presentationml/2006/main">
-  <p:cSld>
-    <p:spTree>
-      <p:nvGrpSpPr>
-        <p:cNvPr id="1" name=""/>
-        <p:cNvGrpSpPr/>
-        <p:nvPr/>
-      </p:nvGrpSpPr>
-      <p:grpSpPr>
-        <a:xfrm>
-          <a:off x="0" y="0"/>
-          <a:ext cx="0" cy="0"/>
-          <a:chOff x="0" y="0"/>
-          <a:chExt cx="0" cy="0"/>
-        </a:xfrm>
-      </p:grpSpPr>
-      <p:sp>
-        <p:nvSpPr>
-          <p:cNvPr id="2" name="Title 1"/>
-          <p:cNvSpPr>
-            <a:spLocks noGrp="1"/>
-          </p:cNvSpPr>
-          <p:nvPr>
-            <p:ph type="title"/>
-          </p:nvPr>
-        </p:nvSpPr>
-        <p:spPr>
-          <a:xfrm>
-            <a:off x="838200" y="365126"/>
-            <a:ext cx="10515600" cy="757272"/>
-          </a:xfrm>
-        </p:spPr>
-        <p:txBody>
-          <a:bodyPr>
-            <a:normAutofit/>
-          </a:bodyPr>
-          <a:lstStyle/>
-          <a:p>
-            <a:r>
-              <a:rPr lang="en-US" sz="3600" dirty="0"/>
-              <a:t>Learning Objectives – Week 3</a:t>
-            </a:r>
-            <a:endParaRPr lang="en-US" sz="3600" b="1" i="1" u="sng" dirty="0"/>
-          </a:p>
-        </p:txBody>
-      </p:sp>
-      <p:sp>
-        <p:nvSpPr>
-          <p:cNvPr id="3" name="Content Placeholder 2"/>
-          <p:cNvSpPr>
-            <a:spLocks noGrp="1"/>
-          </p:cNvSpPr>
-          <p:nvPr>
-            <p:ph idx="1"/>
-          </p:nvPr>
-        </p:nvSpPr>
-        <p:spPr>
-          <a:xfrm>
-            <a:off x="838200" y="1122398"/>
-            <a:ext cx="10718950" cy="5463343"/>
-          </a:xfrm>
-        </p:spPr>
-        <p:txBody>
-          <a:bodyPr>
-            <a:normAutofit/>
-          </a:bodyPr>
-          <a:lstStyle/>
-          <a:p>
-            <a:pPr marL="457200" indent="-457200">
-              <a:buFont typeface="+mj-lt"/>
-              <a:buAutoNum type="arabicPeriod"/>
-            </a:pPr>
-            <a:r>
-              <a:rPr lang="en-US" sz="2000" dirty="0"/>
-              <a:t>Explain the difference between lightweight and heavyweight components</a:t>
-            </a:r>
-          </a:p>
-          <a:p>
-            <a:pPr marL="457200" indent="-457200">
-              <a:buFont typeface="+mj-lt"/>
-              <a:buAutoNum type="arabicPeriod"/>
-            </a:pPr>
-            <a:r>
-              <a:rPr lang="en-US" sz="2000" dirty="0"/>
-              <a:t>Identify lightweight and heavyweight components</a:t>
-            </a:r>
-          </a:p>
-          <a:p>
-            <a:pPr marL="457200" indent="-457200">
-              <a:buFont typeface="+mj-lt"/>
-              <a:buAutoNum type="arabicPeriod"/>
-            </a:pPr>
-            <a:r>
-              <a:rPr lang="en-US" sz="2000" dirty="0"/>
-              <a:t>Describe how lightweight and heavyweight components render themselves</a:t>
-            </a:r>
-          </a:p>
-          <a:p>
-            <a:pPr marL="457200" indent="-457200">
-              <a:buFont typeface="+mj-lt"/>
-              <a:buAutoNum type="arabicPeriod"/>
-            </a:pPr>
-            <a:r>
-              <a:rPr lang="en-US" sz="2000" dirty="0"/>
-              <a:t>Identify layout managers for heavyweight and lightweight components</a:t>
-            </a:r>
-          </a:p>
-          <a:p>
-            <a:pPr marL="457200" indent="-457200">
-              <a:buFont typeface="+mj-lt"/>
-              <a:buAutoNum type="arabicPeriod"/>
-            </a:pPr>
-            <a:r>
-              <a:rPr lang="en-US" sz="2000" dirty="0"/>
-              <a:t>Explain what a layout manager does and identify and describe three of them</a:t>
-            </a:r>
-          </a:p>
-          <a:p>
-            <a:pPr marL="457200" indent="-457200">
-              <a:buFont typeface="+mj-lt"/>
-              <a:buAutoNum type="arabicPeriod"/>
-            </a:pPr>
-            <a:r>
-              <a:rPr lang="en-US" sz="2000" dirty="0"/>
-              <a:t>Explain how to achieve true Model-View-Controller architecture by removing any reference from the view to the model and from the model to the view</a:t>
-            </a:r>
-          </a:p>
-          <a:p>
-            <a:pPr marL="457200" indent="-457200">
-              <a:buFont typeface="+mj-lt"/>
-              <a:buAutoNum type="arabicPeriod"/>
-            </a:pPr>
-            <a:r>
-              <a:rPr lang="en-US" sz="2000" dirty="0"/>
-              <a:t>Distinguish between extending a class and implementing an interface</a:t>
-            </a:r>
-          </a:p>
-          <a:p>
-            <a:pPr marL="457200" indent="-457200">
-              <a:buFont typeface="+mj-lt"/>
-              <a:buAutoNum type="arabicPeriod"/>
-            </a:pPr>
-            <a:r>
-              <a:rPr lang="en-US" sz="2000" dirty="0"/>
-              <a:t>Explain multiple ways to implement an event handler for a particular object and event (anonymous inner classes vs. named classes vs. having the frame itself serve as the handler)</a:t>
-            </a:r>
-          </a:p>
-          <a:p>
-            <a:pPr marL="457200" indent="-457200">
-              <a:buFont typeface="+mj-lt"/>
-              <a:buAutoNum type="arabicPeriod"/>
-            </a:pPr>
-            <a:r>
-              <a:rPr lang="en-US" sz="2000" dirty="0"/>
-              <a:t>Create an event handler that implements the ActionListener interface to respond to the user clicking on a button</a:t>
-            </a:r>
-          </a:p>
-          <a:p>
-            <a:pPr marL="457200" indent="-457200">
-              <a:buFont typeface="+mj-lt"/>
-              <a:buAutoNum type="arabicPeriod"/>
-            </a:pPr>
-            <a:r>
-              <a:rPr lang="en-US" sz="2000" dirty="0"/>
-              <a:t>Use paint and </a:t>
-            </a:r>
-            <a:r>
-              <a:rPr lang="en-US" sz="2000" dirty="0" err="1"/>
-              <a:t>paintComponent's</a:t>
-            </a:r>
-            <a:r>
-              <a:rPr lang="en-US" sz="2000" dirty="0"/>
-              <a:t> Graphics object to draw a variety of shapes</a:t>
-            </a:r>
-          </a:p>
-        </p:txBody>
-      </p:sp>
-    </p:spTree>
-    <p:extLst>
-      <p:ext uri="{BB962C8B-B14F-4D97-AF65-F5344CB8AC3E}">
-        <p14:creationId xmlns:p14="http://schemas.microsoft.com/office/powerpoint/2010/main" val="1072399538"/>
-      </p:ext>
-    </p:extLst>
-  </p:cSld>
-  <p:clrMapOvr>
-    <a:masterClrMapping/>
-  </p:clrMapOvr>
-</p:sld>
-</file>
-
-<file path=ppt/slides/slide30.xml><?xml version="1.0" encoding="utf-8"?>
+<file path=ppt/slides/slide32.xml><?xml version="1.0" encoding="utf-8"?>
 <p:sld xmlns:a="http://schemas.openxmlformats.org/drawingml/2006/main" xmlns:r="http://schemas.openxmlformats.org/officeDocument/2006/relationships" xmlns:p="http://schemas.openxmlformats.org/presentationml/2006/main">
   <p:cSld>
     <p:spTree>
@@ -12258,7 +13662,7 @@
 </p:sld>
 </file>
 
-<file path=ppt/slides/slide31.xml><?xml version="1.0" encoding="utf-8"?>
+<file path=ppt/slides/slide33.xml><?xml version="1.0" encoding="utf-8"?>
 <p:sld xmlns:a="http://schemas.openxmlformats.org/drawingml/2006/main" xmlns:r="http://schemas.openxmlformats.org/officeDocument/2006/relationships" xmlns:p="http://schemas.openxmlformats.org/presentationml/2006/main">
   <p:cSld>
     <p:spTree>
@@ -12679,322 +14083,6 @@
 </p:sld>
 </file>
 
-<file path=ppt/slides/slide32.xml><?xml version="1.0" encoding="utf-8"?>
-<p:sld xmlns:a="http://schemas.openxmlformats.org/drawingml/2006/main" xmlns:r="http://schemas.openxmlformats.org/officeDocument/2006/relationships" xmlns:p="http://schemas.openxmlformats.org/presentationml/2006/main">
-  <p:cSld>
-    <p:spTree>
-      <p:nvGrpSpPr>
-        <p:cNvPr id="1" name=""/>
-        <p:cNvGrpSpPr/>
-        <p:nvPr/>
-      </p:nvGrpSpPr>
-      <p:grpSpPr>
-        <a:xfrm>
-          <a:off x="0" y="0"/>
-          <a:ext cx="0" cy="0"/>
-          <a:chOff x="0" y="0"/>
-          <a:chExt cx="0" cy="0"/>
-        </a:xfrm>
-      </p:grpSpPr>
-      <p:sp>
-        <p:nvSpPr>
-          <p:cNvPr id="2" name="Title 1"/>
-          <p:cNvSpPr>
-            <a:spLocks noGrp="1"/>
-          </p:cNvSpPr>
-          <p:nvPr>
-            <p:ph type="title"/>
-          </p:nvPr>
-        </p:nvSpPr>
-        <p:spPr/>
-        <p:txBody>
-          <a:bodyPr>
-            <a:normAutofit/>
-          </a:bodyPr>
-          <a:lstStyle/>
-          <a:p>
-            <a:r>
-              <a:rPr lang="en-US" sz="3600" dirty="0"/>
-              <a:t>Quick Review: Event Handling</a:t>
-            </a:r>
-          </a:p>
-        </p:txBody>
-      </p:sp>
-      <p:sp>
-        <p:nvSpPr>
-          <p:cNvPr id="3" name="Content Placeholder 2"/>
-          <p:cNvSpPr>
-            <a:spLocks noGrp="1"/>
-          </p:cNvSpPr>
-          <p:nvPr>
-            <p:ph idx="1"/>
-          </p:nvPr>
-        </p:nvSpPr>
-        <p:spPr>
-          <a:xfrm>
-            <a:off x="838198" y="1525772"/>
-            <a:ext cx="10515601" cy="4651191"/>
-          </a:xfrm>
-        </p:spPr>
-        <p:txBody>
-          <a:bodyPr>
-            <a:normAutofit/>
-          </a:bodyPr>
-          <a:lstStyle/>
-          <a:p>
-            <a:pPr marL="0" indent="0">
-              <a:buNone/>
-            </a:pPr>
-            <a:r>
-              <a:rPr lang="en-US" sz="2000" dirty="0"/>
-              <a:t>Clicking Event Handling is the way that all graphic user interface environment allow an application to respond to user (or system) events. Possible events include:</a:t>
-            </a:r>
-          </a:p>
-          <a:p>
-            <a:r>
-              <a:rPr lang="en-US" sz="2000" dirty="0"/>
-              <a:t>Keyboard strokes</a:t>
-            </a:r>
-          </a:p>
-          <a:p>
-            <a:r>
-              <a:rPr lang="en-US" sz="2000" dirty="0"/>
-              <a:t>Clicking buttons</a:t>
-            </a:r>
-          </a:p>
-          <a:p>
-            <a:r>
-              <a:rPr lang="en-US" sz="2000" dirty="0"/>
-              <a:t>Dragging a mouse</a:t>
-            </a:r>
-          </a:p>
-          <a:p>
-            <a:r>
-              <a:rPr lang="en-US" sz="2000" dirty="0"/>
-              <a:t>Low power warning or automatic system hibernation</a:t>
-            </a:r>
-          </a:p>
-          <a:p>
-            <a:r>
-              <a:rPr lang="en-US" sz="2000" dirty="0"/>
-              <a:t>Attaching to an overhead projector</a:t>
-            </a:r>
-          </a:p>
-          <a:p>
-            <a:r>
-              <a:rPr lang="en-US" sz="2000" dirty="0"/>
-              <a:t>And many, many others</a:t>
-            </a:r>
-          </a:p>
-          <a:p>
-            <a:pPr marL="0" indent="0">
-              <a:buNone/>
-            </a:pPr>
-            <a:endParaRPr lang="en-US" sz="2000" dirty="0"/>
-          </a:p>
-        </p:txBody>
-      </p:sp>
-    </p:spTree>
-    <p:extLst>
-      <p:ext uri="{BB962C8B-B14F-4D97-AF65-F5344CB8AC3E}">
-        <p14:creationId xmlns:p14="http://schemas.microsoft.com/office/powerpoint/2010/main" val="3820303591"/>
-      </p:ext>
-    </p:extLst>
-  </p:cSld>
-  <p:clrMapOvr>
-    <a:masterClrMapping/>
-  </p:clrMapOvr>
-</p:sld>
-</file>
-
-<file path=ppt/slides/slide33.xml><?xml version="1.0" encoding="utf-8"?>
-<p:sld xmlns:a="http://schemas.openxmlformats.org/drawingml/2006/main" xmlns:r="http://schemas.openxmlformats.org/officeDocument/2006/relationships" xmlns:p="http://schemas.openxmlformats.org/presentationml/2006/main">
-  <p:cSld>
-    <p:spTree>
-      <p:nvGrpSpPr>
-        <p:cNvPr id="1" name=""/>
-        <p:cNvGrpSpPr/>
-        <p:nvPr/>
-      </p:nvGrpSpPr>
-      <p:grpSpPr>
-        <a:xfrm>
-          <a:off x="0" y="0"/>
-          <a:ext cx="0" cy="0"/>
-          <a:chOff x="0" y="0"/>
-          <a:chExt cx="0" cy="0"/>
-        </a:xfrm>
-      </p:grpSpPr>
-      <p:sp>
-        <p:nvSpPr>
-          <p:cNvPr id="2" name="Title 1"/>
-          <p:cNvSpPr>
-            <a:spLocks noGrp="1"/>
-          </p:cNvSpPr>
-          <p:nvPr>
-            <p:ph type="title"/>
-          </p:nvPr>
-        </p:nvSpPr>
-        <p:spPr/>
-        <p:txBody>
-          <a:bodyPr>
-            <a:normAutofit/>
-          </a:bodyPr>
-          <a:lstStyle/>
-          <a:p>
-            <a:r>
-              <a:rPr lang="en-US" sz="3600" dirty="0"/>
-              <a:t>Quick Review: Event Handling – ActionListener</a:t>
-            </a:r>
-          </a:p>
-        </p:txBody>
-      </p:sp>
-      <p:sp>
-        <p:nvSpPr>
-          <p:cNvPr id="3" name="Content Placeholder 2"/>
-          <p:cNvSpPr>
-            <a:spLocks noGrp="1"/>
-          </p:cNvSpPr>
-          <p:nvPr>
-            <p:ph idx="1"/>
-          </p:nvPr>
-        </p:nvSpPr>
-        <p:spPr>
-          <a:xfrm>
-            <a:off x="838198" y="1525772"/>
-            <a:ext cx="10515601" cy="4651191"/>
-          </a:xfrm>
-        </p:spPr>
-        <p:txBody>
-          <a:bodyPr>
-            <a:normAutofit/>
-          </a:bodyPr>
-          <a:lstStyle/>
-          <a:p>
-            <a:pPr marL="0" indent="0">
-              <a:buNone/>
-            </a:pPr>
-            <a:r>
-              <a:rPr lang="en-US" sz="2000" dirty="0"/>
-              <a:t>We will specifically need to implement Java </a:t>
-            </a:r>
-            <a:r>
-              <a:rPr lang="en-US" sz="2000" dirty="0" err="1"/>
-              <a:t>ActionListeners</a:t>
-            </a:r>
-            <a:r>
-              <a:rPr lang="en-US" sz="2000" dirty="0"/>
-              <a:t> to respond to button clicks. To do that we will need to:</a:t>
-            </a:r>
-          </a:p>
-          <a:p>
-            <a:r>
-              <a:rPr lang="en-US" sz="2000" dirty="0"/>
-              <a:t>Understand that </a:t>
-            </a:r>
-            <a:r>
-              <a:rPr lang="en-US" sz="2000" b="1" dirty="0"/>
-              <a:t>ActionListener</a:t>
-            </a:r>
-            <a:r>
-              <a:rPr lang="en-US" sz="2000" dirty="0"/>
-              <a:t>, like other listeners, are an </a:t>
-            </a:r>
-            <a:r>
-              <a:rPr lang="en-US" sz="2000" b="1" dirty="0"/>
-              <a:t>interface</a:t>
-            </a:r>
-            <a:r>
-              <a:rPr lang="en-US" sz="2000" dirty="0"/>
-              <a:t>… not a class</a:t>
-            </a:r>
-          </a:p>
-          <a:p>
-            <a:r>
-              <a:rPr lang="en-US" sz="2000" dirty="0"/>
-              <a:t>Implement a Java </a:t>
-            </a:r>
-            <a:r>
-              <a:rPr lang="en-US" sz="2000" dirty="0" err="1"/>
-              <a:t>ActionListeners</a:t>
-            </a:r>
-            <a:r>
-              <a:rPr lang="en-US" sz="2000" dirty="0"/>
-              <a:t> Interface</a:t>
-            </a:r>
-          </a:p>
-          <a:p>
-            <a:r>
-              <a:rPr lang="en-US" sz="2000" dirty="0"/>
-              <a:t>Utilize our ActionListener to receive notifications of an event and respond appropriately</a:t>
-            </a:r>
-          </a:p>
-          <a:p>
-            <a:r>
-              <a:rPr lang="en-US" sz="2000" dirty="0"/>
-              <a:t>Understand the three ways we could implement an ActionListener to respond to a user pressing a button contained in a our </a:t>
-            </a:r>
-            <a:r>
-              <a:rPr lang="en-US" sz="2000" dirty="0" err="1"/>
-              <a:t>JFrame</a:t>
-            </a:r>
-            <a:r>
-              <a:rPr lang="en-US" sz="2000" dirty="0"/>
-              <a:t>:</a:t>
-            </a:r>
-          </a:p>
-          <a:p>
-            <a:pPr marL="800100" lvl="1" indent="-342900">
-              <a:buFont typeface="+mj-lt"/>
-              <a:buAutoNum type="arabicPeriod"/>
-            </a:pPr>
-            <a:r>
-              <a:rPr lang="en-US" sz="1600" dirty="0"/>
-              <a:t>Implement an ActionListener interface in our  </a:t>
-            </a:r>
-            <a:r>
-              <a:rPr lang="en-US" sz="1600" dirty="0" err="1"/>
-              <a:t>JFrame</a:t>
-            </a:r>
-            <a:r>
-              <a:rPr lang="en-US" sz="1600" dirty="0"/>
-              <a:t> </a:t>
-            </a:r>
-          </a:p>
-          <a:p>
-            <a:pPr marL="800100" lvl="1" indent="-342900">
-              <a:buFont typeface="+mj-lt"/>
-              <a:buAutoNum type="arabicPeriod"/>
-            </a:pPr>
-            <a:r>
-              <a:rPr lang="en-US" sz="1600" dirty="0"/>
-              <a:t>Utilize an external class that implements ActionListener</a:t>
-            </a:r>
-          </a:p>
-          <a:p>
-            <a:pPr marL="800100" lvl="1" indent="-342900">
-              <a:buFont typeface="+mj-lt"/>
-              <a:buAutoNum type="arabicPeriod"/>
-            </a:pPr>
-            <a:r>
-              <a:rPr lang="en-US" sz="1600" dirty="0"/>
-              <a:t>Implement an ActionListener utilizing an Anonymous Inner Class  </a:t>
-            </a:r>
-          </a:p>
-        </p:txBody>
-      </p:sp>
-    </p:spTree>
-    <p:extLst>
-      <p:ext uri="{BB962C8B-B14F-4D97-AF65-F5344CB8AC3E}">
-        <p14:creationId xmlns:p14="http://schemas.microsoft.com/office/powerpoint/2010/main" val="2709768263"/>
-      </p:ext>
-    </p:extLst>
-  </p:cSld>
-  <p:clrMapOvr>
-    <a:masterClrMapping/>
-  </p:clrMapOvr>
-</p:sld>
-</file>
-
 <file path=ppt/slides/slide34.xml><?xml version="1.0" encoding="utf-8"?>
 <p:sld xmlns:a="http://schemas.openxmlformats.org/drawingml/2006/main" xmlns:r="http://schemas.openxmlformats.org/officeDocument/2006/relationships" xmlns:p="http://schemas.openxmlformats.org/presentationml/2006/main">
   <p:cSld>
@@ -13031,9 +14119,8 @@
           <a:p>
             <a:r>
               <a:rPr lang="en-US" sz="3600" dirty="0"/>
-              <a:t>Live Demo: Event Handlers &amp; Action Listener</a:t>
-            </a:r>
-            <a:endParaRPr lang="en-US" sz="3600" dirty="0"/>
+              <a:t>Quick Review: Event Handling</a:t>
+            </a:r>
           </a:p>
         </p:txBody>
       </p:sp>
@@ -13064,160 +14151,57 @@
             </a:pPr>
             <a:r>
               <a:rPr lang="en-US" sz="2000" dirty="0"/>
-              <a:t>Let’s implement a new Java application to demonstrate a graphic application that responds to clicking a button. To demonstrate this we will:</a:t>
-            </a:r>
-          </a:p>
-          <a:p>
-            <a:r>
-              <a:rPr lang="en-US" sz="2000" dirty="0"/>
-              <a:t>Create a Java graphic application</a:t>
-            </a:r>
-          </a:p>
-          <a:p>
-            <a:r>
-              <a:rPr lang="en-US" sz="2000" dirty="0"/>
-              <a:t>Create a </a:t>
-            </a:r>
-            <a:r>
-              <a:rPr lang="en-US" sz="2000" dirty="0" err="1"/>
-              <a:t>JFrame</a:t>
-            </a:r>
-            <a:r>
-              <a:rPr lang="en-US" sz="2000" dirty="0"/>
-              <a:t> and </a:t>
-            </a:r>
-            <a:r>
-              <a:rPr lang="en-US" sz="2000" dirty="0" err="1"/>
-              <a:t>JPanel</a:t>
-            </a:r>
-            <a:r>
-              <a:rPr lang="en-US" sz="2000" dirty="0"/>
-              <a:t> </a:t>
-            </a:r>
-          </a:p>
-          <a:p>
-            <a:r>
-              <a:rPr lang="en-US" sz="2000" dirty="0"/>
-              <a:t>Implement a Layout Manager (</a:t>
-            </a:r>
-            <a:r>
-              <a:rPr lang="en-US" sz="2000" dirty="0" err="1"/>
-              <a:t>BorderLayout</a:t>
-            </a:r>
-            <a:r>
-              <a:rPr lang="en-US" sz="2000" dirty="0"/>
-              <a:t>) </a:t>
-            </a:r>
-            <a:r>
-              <a:rPr lang="en-US" sz="2000" dirty="0"/>
-              <a:t>on our </a:t>
-            </a:r>
-            <a:r>
-              <a:rPr lang="en-US" sz="2000" dirty="0" err="1"/>
-              <a:t>JFrame</a:t>
-            </a:r>
+              <a:t>Clicking Event Handling is the way that all graphic user interface environment allow an application to respond to user (or system) events. Possible events include:</a:t>
+            </a:r>
+          </a:p>
+          <a:p>
+            <a:r>
+              <a:rPr lang="en-US" sz="2000" dirty="0"/>
+              <a:t>Keyboard strokes</a:t>
+            </a:r>
+          </a:p>
+          <a:p>
+            <a:r>
+              <a:rPr lang="en-US" sz="2000" dirty="0"/>
+              <a:t>Clicking buttons</a:t>
+            </a:r>
+          </a:p>
+          <a:p>
+            <a:r>
+              <a:rPr lang="en-US" sz="2000" dirty="0"/>
+              <a:t>Dragging a mouse</a:t>
+            </a:r>
+          </a:p>
+          <a:p>
+            <a:r>
+              <a:rPr lang="en-US" sz="2000" dirty="0"/>
+              <a:t>Low power warning or automatic system hibernation</a:t>
+            </a:r>
+          </a:p>
+          <a:p>
+            <a:r>
+              <a:rPr lang="en-US" sz="2000" dirty="0"/>
+              <a:t>Attaching to an overhead projector</a:t>
+            </a:r>
+          </a:p>
+          <a:p>
+            <a:r>
+              <a:rPr lang="en-US" sz="2000" dirty="0"/>
+              <a:t>And many, many others</a:t>
+            </a:r>
+          </a:p>
+          <a:p>
+            <a:pPr marL="0" indent="0">
+              <a:buNone/>
+            </a:pPr>
             <a:endParaRPr lang="en-US" sz="2000" dirty="0"/>
-          </a:p>
-          <a:p>
-            <a:r>
-              <a:rPr lang="en-US" sz="2000" dirty="0"/>
-              <a:t>Create and insert </a:t>
-            </a:r>
-            <a:r>
-              <a:rPr lang="en-US" sz="2000" dirty="0" err="1"/>
-              <a:t>JButtons</a:t>
-            </a:r>
-            <a:r>
-              <a:rPr lang="en-US" sz="2000" dirty="0"/>
-              <a:t> in our </a:t>
-            </a:r>
-            <a:r>
-              <a:rPr lang="en-US" sz="2000" dirty="0" err="1"/>
-              <a:t>JPanel</a:t>
-            </a:r>
-            <a:r>
-              <a:rPr lang="en-US" sz="2000" dirty="0"/>
-              <a:t> </a:t>
-            </a:r>
-          </a:p>
-          <a:p>
-            <a:r>
-              <a:rPr lang="en-US" sz="2000" dirty="0"/>
-              <a:t>Insert our </a:t>
-            </a:r>
-            <a:r>
-              <a:rPr lang="en-US" sz="2000" dirty="0" err="1"/>
-              <a:t>JPanel</a:t>
-            </a:r>
-            <a:r>
-              <a:rPr lang="en-US" sz="2000" dirty="0"/>
-              <a:t> into the SOUTH section of our </a:t>
-            </a:r>
-            <a:r>
-              <a:rPr lang="en-US" sz="2000" dirty="0" err="1"/>
-              <a:t>BorderLayout</a:t>
-            </a:r>
-            <a:r>
-              <a:rPr lang="en-US" sz="2000" dirty="0"/>
-              <a:t>  Layout Manager</a:t>
-            </a:r>
-          </a:p>
-          <a:p>
-            <a:r>
-              <a:rPr lang="en-US" sz="2000" dirty="0"/>
-              <a:t>Create Action Listeners that can respond to our Buttons being clicked</a:t>
-            </a:r>
-          </a:p>
-          <a:p>
-            <a:r>
-              <a:rPr lang="en-US" sz="2000" dirty="0"/>
-              <a:t>Each of our three buttons will utilize one of  the ActionListener implementation practices:</a:t>
-            </a:r>
-          </a:p>
-          <a:p>
-            <a:pPr marL="800100" lvl="1" indent="-342900">
-              <a:buFont typeface="+mj-lt"/>
-              <a:buAutoNum type="arabicPeriod"/>
-            </a:pPr>
-            <a:r>
-              <a:rPr lang="en-US" sz="1600" dirty="0"/>
-              <a:t>Implement an ActionListener interface in our  </a:t>
-            </a:r>
-            <a:r>
-              <a:rPr lang="en-US" sz="1600" dirty="0" err="1"/>
-              <a:t>JFrame</a:t>
-            </a:r>
-            <a:r>
-              <a:rPr lang="en-US" sz="1600" dirty="0"/>
-              <a:t> </a:t>
-            </a:r>
-          </a:p>
-          <a:p>
-            <a:pPr marL="800100" lvl="1" indent="-342900">
-              <a:buFont typeface="+mj-lt"/>
-              <a:buAutoNum type="arabicPeriod"/>
-            </a:pPr>
-            <a:r>
-              <a:rPr lang="en-US" sz="1600" dirty="0"/>
-              <a:t>Utilize an external class that implements ActionListener</a:t>
-            </a:r>
-          </a:p>
-          <a:p>
-            <a:pPr marL="800100" lvl="1" indent="-342900">
-              <a:buFont typeface="+mj-lt"/>
-              <a:buAutoNum type="arabicPeriod"/>
-            </a:pPr>
-            <a:r>
-              <a:rPr lang="en-US" sz="1600" dirty="0"/>
-              <a:t>Implement an ActionListener utilizing an Anonymous Inner Class  </a:t>
-            </a:r>
           </a:p>
         </p:txBody>
       </p:sp>
     </p:spTree>
     <p:extLst>
       <p:ext uri="{BB962C8B-B14F-4D97-AF65-F5344CB8AC3E}">
-        <p14:creationId xmlns:p14="http://schemas.microsoft.com/office/powerpoint/2010/main" val="2032343741"/>
+        <p14:creationId xmlns:p14="http://schemas.microsoft.com/office/powerpoint/2010/main" val="3820303591"/>
       </p:ext>
     </p:extLst>
   </p:cSld>
@@ -13254,6 +14238,421 @@
             <p:ph type="title"/>
           </p:nvPr>
         </p:nvSpPr>
+        <p:spPr/>
+        <p:txBody>
+          <a:bodyPr>
+            <a:normAutofit/>
+          </a:bodyPr>
+          <a:lstStyle/>
+          <a:p>
+            <a:r>
+              <a:rPr lang="en-US" sz="3600" dirty="0"/>
+              <a:t>Quick Review: Event Handling – ActionListener</a:t>
+            </a:r>
+          </a:p>
+        </p:txBody>
+      </p:sp>
+      <p:sp>
+        <p:nvSpPr>
+          <p:cNvPr id="3" name="Content Placeholder 2"/>
+          <p:cNvSpPr>
+            <a:spLocks noGrp="1"/>
+          </p:cNvSpPr>
+          <p:nvPr>
+            <p:ph idx="1"/>
+          </p:nvPr>
+        </p:nvSpPr>
+        <p:spPr>
+          <a:xfrm>
+            <a:off x="838198" y="1525772"/>
+            <a:ext cx="10515601" cy="4651191"/>
+          </a:xfrm>
+        </p:spPr>
+        <p:txBody>
+          <a:bodyPr>
+            <a:normAutofit/>
+          </a:bodyPr>
+          <a:lstStyle/>
+          <a:p>
+            <a:pPr marL="0" indent="0">
+              <a:buNone/>
+            </a:pPr>
+            <a:r>
+              <a:rPr lang="en-US" sz="2000" dirty="0"/>
+              <a:t>We will specifically need to implement Java </a:t>
+            </a:r>
+            <a:r>
+              <a:rPr lang="en-US" sz="2000" dirty="0" err="1"/>
+              <a:t>ActionListeners</a:t>
+            </a:r>
+            <a:r>
+              <a:rPr lang="en-US" sz="2000" dirty="0"/>
+              <a:t> to respond to button clicks. To do that we will need to:</a:t>
+            </a:r>
+          </a:p>
+          <a:p>
+            <a:r>
+              <a:rPr lang="en-US" sz="2000" dirty="0"/>
+              <a:t>Understand that </a:t>
+            </a:r>
+            <a:r>
+              <a:rPr lang="en-US" sz="2000" b="1" dirty="0"/>
+              <a:t>ActionListener</a:t>
+            </a:r>
+            <a:r>
+              <a:rPr lang="en-US" sz="2000" dirty="0"/>
+              <a:t>, like other listeners, are an </a:t>
+            </a:r>
+            <a:r>
+              <a:rPr lang="en-US" sz="2000" b="1" dirty="0"/>
+              <a:t>interface</a:t>
+            </a:r>
+            <a:r>
+              <a:rPr lang="en-US" sz="2000" dirty="0"/>
+              <a:t>… not a class</a:t>
+            </a:r>
+          </a:p>
+          <a:p>
+            <a:r>
+              <a:rPr lang="en-US" sz="2000" dirty="0"/>
+              <a:t>Implement a Java </a:t>
+            </a:r>
+            <a:r>
+              <a:rPr lang="en-US" sz="2000" dirty="0" err="1"/>
+              <a:t>ActionListeners</a:t>
+            </a:r>
+            <a:r>
+              <a:rPr lang="en-US" sz="2000" dirty="0"/>
+              <a:t> Interface</a:t>
+            </a:r>
+          </a:p>
+          <a:p>
+            <a:r>
+              <a:rPr lang="en-US" sz="2000" dirty="0"/>
+              <a:t>Utilize our ActionListener to receive notifications of an event and respond appropriately</a:t>
+            </a:r>
+          </a:p>
+          <a:p>
+            <a:r>
+              <a:rPr lang="en-US" sz="2000" dirty="0"/>
+              <a:t>Understand the three ways we could implement an ActionListener to respond to a user pressing a button contained in a our </a:t>
+            </a:r>
+            <a:r>
+              <a:rPr lang="en-US" sz="2000" dirty="0" err="1"/>
+              <a:t>JFrame</a:t>
+            </a:r>
+            <a:r>
+              <a:rPr lang="en-US" sz="2000" dirty="0"/>
+              <a:t>:</a:t>
+            </a:r>
+          </a:p>
+          <a:p>
+            <a:pPr marL="800100" lvl="1" indent="-342900">
+              <a:buFont typeface="+mj-lt"/>
+              <a:buAutoNum type="arabicPeriod"/>
+            </a:pPr>
+            <a:r>
+              <a:rPr lang="en-US" sz="1600" dirty="0"/>
+              <a:t>Implement an ActionListener interface in our  </a:t>
+            </a:r>
+            <a:r>
+              <a:rPr lang="en-US" sz="1600" dirty="0" err="1"/>
+              <a:t>JFrame</a:t>
+            </a:r>
+            <a:r>
+              <a:rPr lang="en-US" sz="1600" dirty="0"/>
+              <a:t> </a:t>
+            </a:r>
+          </a:p>
+          <a:p>
+            <a:pPr marL="800100" lvl="1" indent="-342900">
+              <a:buFont typeface="+mj-lt"/>
+              <a:buAutoNum type="arabicPeriod"/>
+            </a:pPr>
+            <a:r>
+              <a:rPr lang="en-US" sz="1600" dirty="0"/>
+              <a:t>Utilize an external class that implements ActionListener</a:t>
+            </a:r>
+          </a:p>
+          <a:p>
+            <a:pPr marL="800100" lvl="1" indent="-342900">
+              <a:buFont typeface="+mj-lt"/>
+              <a:buAutoNum type="arabicPeriod"/>
+            </a:pPr>
+            <a:r>
+              <a:rPr lang="en-US" sz="1600" dirty="0"/>
+              <a:t>Implement an ActionListener utilizing an Anonymous Inner Class  </a:t>
+            </a:r>
+          </a:p>
+        </p:txBody>
+      </p:sp>
+    </p:spTree>
+    <p:extLst>
+      <p:ext uri="{BB962C8B-B14F-4D97-AF65-F5344CB8AC3E}">
+        <p14:creationId xmlns:p14="http://schemas.microsoft.com/office/powerpoint/2010/main" val="2709768263"/>
+      </p:ext>
+    </p:extLst>
+  </p:cSld>
+  <p:clrMapOvr>
+    <a:masterClrMapping/>
+  </p:clrMapOvr>
+</p:sld>
+</file>
+
+<file path=ppt/slides/slide36.xml><?xml version="1.0" encoding="utf-8"?>
+<p:sld xmlns:a="http://schemas.openxmlformats.org/drawingml/2006/main" xmlns:r="http://schemas.openxmlformats.org/officeDocument/2006/relationships" xmlns:p="http://schemas.openxmlformats.org/presentationml/2006/main">
+  <p:cSld>
+    <p:spTree>
+      <p:nvGrpSpPr>
+        <p:cNvPr id="1" name=""/>
+        <p:cNvGrpSpPr/>
+        <p:nvPr/>
+      </p:nvGrpSpPr>
+      <p:grpSpPr>
+        <a:xfrm>
+          <a:off x="0" y="0"/>
+          <a:ext cx="0" cy="0"/>
+          <a:chOff x="0" y="0"/>
+          <a:chExt cx="0" cy="0"/>
+        </a:xfrm>
+      </p:grpSpPr>
+      <p:sp>
+        <p:nvSpPr>
+          <p:cNvPr id="2" name="Title 1"/>
+          <p:cNvSpPr>
+            <a:spLocks noGrp="1"/>
+          </p:cNvSpPr>
+          <p:nvPr>
+            <p:ph type="title"/>
+          </p:nvPr>
+        </p:nvSpPr>
+        <p:spPr/>
+        <p:txBody>
+          <a:bodyPr>
+            <a:normAutofit/>
+          </a:bodyPr>
+          <a:lstStyle/>
+          <a:p>
+            <a:r>
+              <a:rPr lang="en-US" sz="3600" dirty="0"/>
+              <a:t>Live Demo: Event Handlers &amp; Action Listener</a:t>
+            </a:r>
+          </a:p>
+        </p:txBody>
+      </p:sp>
+      <p:sp>
+        <p:nvSpPr>
+          <p:cNvPr id="3" name="Content Placeholder 2"/>
+          <p:cNvSpPr>
+            <a:spLocks noGrp="1"/>
+          </p:cNvSpPr>
+          <p:nvPr>
+            <p:ph idx="1"/>
+          </p:nvPr>
+        </p:nvSpPr>
+        <p:spPr>
+          <a:xfrm>
+            <a:off x="838198" y="1525772"/>
+            <a:ext cx="10515601" cy="4651191"/>
+          </a:xfrm>
+        </p:spPr>
+        <p:txBody>
+          <a:bodyPr>
+            <a:normAutofit/>
+          </a:bodyPr>
+          <a:lstStyle/>
+          <a:p>
+            <a:pPr marL="0" indent="0">
+              <a:buNone/>
+            </a:pPr>
+            <a:r>
+              <a:rPr lang="en-US" sz="2000" dirty="0"/>
+              <a:t>Let’s implement a new Java application to demonstrate a graphic application that responds to clicking a button. To demonstrate this we will:</a:t>
+            </a:r>
+          </a:p>
+          <a:p>
+            <a:r>
+              <a:rPr lang="en-US" sz="2000" dirty="0"/>
+              <a:t>Create a Java graphic application</a:t>
+            </a:r>
+          </a:p>
+          <a:p>
+            <a:r>
+              <a:rPr lang="en-US" sz="2000" dirty="0"/>
+              <a:t>Create a </a:t>
+            </a:r>
+            <a:r>
+              <a:rPr lang="en-US" sz="2000" dirty="0" err="1"/>
+              <a:t>JFrame</a:t>
+            </a:r>
+            <a:r>
+              <a:rPr lang="en-US" sz="2000" dirty="0"/>
+              <a:t> and </a:t>
+            </a:r>
+            <a:r>
+              <a:rPr lang="en-US" sz="2000" dirty="0" err="1"/>
+              <a:t>JPanel</a:t>
+            </a:r>
+            <a:r>
+              <a:rPr lang="en-US" sz="2000" dirty="0"/>
+              <a:t> </a:t>
+            </a:r>
+          </a:p>
+          <a:p>
+            <a:r>
+              <a:rPr lang="en-US" sz="2000" dirty="0"/>
+              <a:t>Implement a Layout Manager (</a:t>
+            </a:r>
+            <a:r>
+              <a:rPr lang="en-US" sz="2000" dirty="0" err="1"/>
+              <a:t>BorderLayout</a:t>
+            </a:r>
+            <a:r>
+              <a:rPr lang="en-US" sz="2000" dirty="0"/>
+              <a:t>) on our </a:t>
+            </a:r>
+            <a:r>
+              <a:rPr lang="en-US" sz="2000" dirty="0" err="1"/>
+              <a:t>JFrame</a:t>
+            </a:r>
+            <a:endParaRPr lang="en-US" sz="2000" dirty="0"/>
+          </a:p>
+          <a:p>
+            <a:r>
+              <a:rPr lang="en-US" sz="2000" dirty="0"/>
+              <a:t>Create and insert </a:t>
+            </a:r>
+            <a:r>
+              <a:rPr lang="en-US" sz="2000" dirty="0" err="1"/>
+              <a:t>JButtons</a:t>
+            </a:r>
+            <a:r>
+              <a:rPr lang="en-US" sz="2000" dirty="0"/>
+              <a:t> in our </a:t>
+            </a:r>
+            <a:r>
+              <a:rPr lang="en-US" sz="2000" dirty="0" err="1"/>
+              <a:t>JPanel</a:t>
+            </a:r>
+            <a:r>
+              <a:rPr lang="en-US" sz="2000" dirty="0"/>
+              <a:t> </a:t>
+            </a:r>
+          </a:p>
+          <a:p>
+            <a:r>
+              <a:rPr lang="en-US" sz="2000" dirty="0"/>
+              <a:t>Insert our </a:t>
+            </a:r>
+            <a:r>
+              <a:rPr lang="en-US" sz="2000" dirty="0" err="1"/>
+              <a:t>JPanel</a:t>
+            </a:r>
+            <a:r>
+              <a:rPr lang="en-US" sz="2000" dirty="0"/>
+              <a:t> into the SOUTH section of our </a:t>
+            </a:r>
+            <a:r>
+              <a:rPr lang="en-US" sz="2000" dirty="0" err="1"/>
+              <a:t>BorderLayout</a:t>
+            </a:r>
+            <a:r>
+              <a:rPr lang="en-US" sz="2000" dirty="0"/>
+              <a:t>  Layout Manager</a:t>
+            </a:r>
+          </a:p>
+          <a:p>
+            <a:r>
+              <a:rPr lang="en-US" sz="2000" dirty="0"/>
+              <a:t>Create Action Listeners that can respond to our Buttons being clicked</a:t>
+            </a:r>
+          </a:p>
+          <a:p>
+            <a:r>
+              <a:rPr lang="en-US" sz="2000" dirty="0"/>
+              <a:t>Each of our three buttons will utilize one of  the ActionListener implementation practices:</a:t>
+            </a:r>
+          </a:p>
+          <a:p>
+            <a:pPr marL="800100" lvl="1" indent="-342900">
+              <a:buFont typeface="+mj-lt"/>
+              <a:buAutoNum type="arabicPeriod"/>
+            </a:pPr>
+            <a:r>
+              <a:rPr lang="en-US" sz="1600" dirty="0"/>
+              <a:t>Implement an ActionListener interface in our  </a:t>
+            </a:r>
+            <a:r>
+              <a:rPr lang="en-US" sz="1600" dirty="0" err="1"/>
+              <a:t>JFrame</a:t>
+            </a:r>
+            <a:r>
+              <a:rPr lang="en-US" sz="1600" dirty="0"/>
+              <a:t> </a:t>
+            </a:r>
+          </a:p>
+          <a:p>
+            <a:pPr marL="800100" lvl="1" indent="-342900">
+              <a:buFont typeface="+mj-lt"/>
+              <a:buAutoNum type="arabicPeriod"/>
+            </a:pPr>
+            <a:r>
+              <a:rPr lang="en-US" sz="1600" dirty="0"/>
+              <a:t>Utilize an external class that implements ActionListener</a:t>
+            </a:r>
+          </a:p>
+          <a:p>
+            <a:pPr marL="800100" lvl="1" indent="-342900">
+              <a:buFont typeface="+mj-lt"/>
+              <a:buAutoNum type="arabicPeriod"/>
+            </a:pPr>
+            <a:r>
+              <a:rPr lang="en-US" sz="1600" dirty="0"/>
+              <a:t>Implement an ActionListener utilizing an Anonymous Inner Class  </a:t>
+            </a:r>
+          </a:p>
+        </p:txBody>
+      </p:sp>
+    </p:spTree>
+    <p:extLst>
+      <p:ext uri="{BB962C8B-B14F-4D97-AF65-F5344CB8AC3E}">
+        <p14:creationId xmlns:p14="http://schemas.microsoft.com/office/powerpoint/2010/main" val="2032343741"/>
+      </p:ext>
+    </p:extLst>
+  </p:cSld>
+  <p:clrMapOvr>
+    <a:masterClrMapping/>
+  </p:clrMapOvr>
+</p:sld>
+</file>
+
+<file path=ppt/slides/slide37.xml><?xml version="1.0" encoding="utf-8"?>
+<p:sld xmlns:a="http://schemas.openxmlformats.org/drawingml/2006/main" xmlns:r="http://schemas.openxmlformats.org/officeDocument/2006/relationships" xmlns:p="http://schemas.openxmlformats.org/presentationml/2006/main">
+  <p:cSld>
+    <p:spTree>
+      <p:nvGrpSpPr>
+        <p:cNvPr id="1" name=""/>
+        <p:cNvGrpSpPr/>
+        <p:nvPr/>
+      </p:nvGrpSpPr>
+      <p:grpSpPr>
+        <a:xfrm>
+          <a:off x="0" y="0"/>
+          <a:ext cx="0" cy="0"/>
+          <a:chOff x="0" y="0"/>
+          <a:chExt cx="0" cy="0"/>
+        </a:xfrm>
+      </p:grpSpPr>
+      <p:sp>
+        <p:nvSpPr>
+          <p:cNvPr id="2" name="Title 1"/>
+          <p:cNvSpPr>
+            <a:spLocks noGrp="1"/>
+          </p:cNvSpPr>
+          <p:nvPr>
+            <p:ph type="title"/>
+          </p:nvPr>
+        </p:nvSpPr>
         <p:spPr>
           <a:xfrm>
             <a:off x="838200" y="365126"/>
@@ -13418,7 +14817,7 @@
 </p:sld>
 </file>
 
-<file path=ppt/slides/slide36.xml><?xml version="1.0" encoding="utf-8"?>
+<file path=ppt/slides/slide38.xml><?xml version="1.0" encoding="utf-8"?>
 <p:sld xmlns:a="http://schemas.openxmlformats.org/drawingml/2006/main" xmlns:r="http://schemas.openxmlformats.org/officeDocument/2006/relationships" xmlns:p="http://schemas.openxmlformats.org/presentationml/2006/main">
   <p:cSld>
     <p:spTree>
@@ -13640,7 +15039,7 @@
 </p:sld>
 </file>
 
-<file path=ppt/slides/slide37.xml><?xml version="1.0" encoding="utf-8"?>
+<file path=ppt/slides/slide39.xml><?xml version="1.0" encoding="utf-8"?>
 <p:sld xmlns:a="http://schemas.openxmlformats.org/drawingml/2006/main" xmlns:r="http://schemas.openxmlformats.org/officeDocument/2006/relationships" xmlns:p="http://schemas.openxmlformats.org/presentationml/2006/main">
   <p:cSld>
     <p:bg>
@@ -15673,6 +17072,21 @@
 </file>
 
 <file path=customXml/item1.xml><?xml version="1.0" encoding="utf-8"?>
+<?mso-contentType ?>
+<FormTemplates xmlns="http://schemas.microsoft.com/sharepoint/v3/contenttype/forms">
+  <Display>DocumentLibraryForm</Display>
+  <Edit>DocumentLibraryForm</Edit>
+  <New>DocumentLibraryForm</New>
+</FormTemplates>
+</file>
+
+<file path=customXml/item2.xml><?xml version="1.0" encoding="utf-8"?>
+<p:properties xmlns:p="http://schemas.microsoft.com/office/2006/metadata/properties" xmlns:xsi="http://www.w3.org/2001/XMLSchema-instance" xmlns:pc="http://schemas.microsoft.com/office/infopath/2007/PartnerControls">
+  <documentManagement/>
+</p:properties>
+</file>
+
+<file path=customXml/item3.xml><?xml version="1.0" encoding="utf-8"?>
 <ct:contentTypeSchema xmlns:ct="http://schemas.microsoft.com/office/2006/metadata/contentType" xmlns:ma="http://schemas.microsoft.com/office/2006/metadata/properties/metaAttributes" ct:_="" ma:_="" ma:contentTypeName="Document" ma:contentTypeID="0x0101004E7FF26E314236448B954F3A97640002" ma:contentTypeVersion="0" ma:contentTypeDescription="Create a new document." ma:contentTypeScope="" ma:versionID="dcd134f7ef3b1aa8a267b1d1a9f0b332">
   <xsd:schema xmlns:xsd="http://www.w3.org/2001/XMLSchema" xmlns:xs="http://www.w3.org/2001/XMLSchema" xmlns:p="http://schemas.microsoft.com/office/2006/metadata/properties" targetNamespace="http://schemas.microsoft.com/office/2006/metadata/properties" ma:root="true" ma:fieldsID="fad425956ca267ea5e6d723b3f3bd6f1">
     <xsd:element name="properties">
@@ -15786,22 +17200,30 @@
 </ct:contentTypeSchema>
 </file>
 
-<file path=customXml/item2.xml><?xml version="1.0" encoding="utf-8"?>
-<p:properties xmlns:p="http://schemas.microsoft.com/office/2006/metadata/properties" xmlns:xsi="http://www.w3.org/2001/XMLSchema-instance" xmlns:pc="http://schemas.microsoft.com/office/infopath/2007/PartnerControls">
-  <documentManagement/>
-</p:properties>
+<file path=customXml/itemProps1.xml><?xml version="1.0" encoding="utf-8"?>
+<ds:datastoreItem xmlns:ds="http://schemas.openxmlformats.org/officeDocument/2006/customXml" ds:itemID="{87FD8B20-B89A-4B23-9329-175195DD4D8A}">
+  <ds:schemaRefs>
+    <ds:schemaRef ds:uri="http://schemas.microsoft.com/sharepoint/v3/contenttype/forms"/>
+  </ds:schemaRefs>
+</ds:datastoreItem>
 </file>
 
-<file path=customXml/item3.xml><?xml version="1.0" encoding="utf-8"?>
-<?mso-contentType ?>
-<FormTemplates xmlns="http://schemas.microsoft.com/sharepoint/v3/contenttype/forms">
-  <Display>DocumentLibraryForm</Display>
-  <Edit>DocumentLibraryForm</Edit>
-  <New>DocumentLibraryForm</New>
-</FormTemplates>
+<file path=customXml/itemProps2.xml><?xml version="1.0" encoding="utf-8"?>
+<ds:datastoreItem xmlns:ds="http://schemas.openxmlformats.org/officeDocument/2006/customXml" ds:itemID="{3473EA1A-2744-48E8-B2A3-4F89C0FC849C}">
+  <ds:schemaRefs>
+    <ds:schemaRef ds:uri="http://purl.org/dc/elements/1.1/"/>
+    <ds:schemaRef ds:uri="http://schemas.microsoft.com/office/2006/metadata/properties"/>
+    <ds:schemaRef ds:uri="http://schemas.microsoft.com/office/2006/documentManagement/types"/>
+    <ds:schemaRef ds:uri="http://purl.org/dc/terms/"/>
+    <ds:schemaRef ds:uri="http://schemas.openxmlformats.org/package/2006/metadata/core-properties"/>
+    <ds:schemaRef ds:uri="http://purl.org/dc/dcmitype/"/>
+    <ds:schemaRef ds:uri="http://schemas.microsoft.com/office/infopath/2007/PartnerControls"/>
+    <ds:schemaRef ds:uri="http://www.w3.org/XML/1998/namespace"/>
+  </ds:schemaRefs>
+</ds:datastoreItem>
 </file>
 
-<file path=customXml/itemProps1.xml><?xml version="1.0" encoding="utf-8"?>
+<file path=customXml/itemProps3.xml><?xml version="1.0" encoding="utf-8"?>
 <ds:datastoreItem xmlns:ds="http://schemas.openxmlformats.org/officeDocument/2006/customXml" ds:itemID="{A906A71E-D2C6-4CAA-8E79-10C504BC5F58}">
   <ds:schemaRefs>
     <ds:schemaRef ds:uri="http://schemas.microsoft.com/office/2006/metadata/contentType"/>
@@ -15815,27 +17237,4 @@
     <ds:schemaRef ds:uri="http://schemas.microsoft.com/office/infopath/2007/PartnerControls"/>
   </ds:schemaRefs>
 </ds:datastoreItem>
-</file>
-
-<file path=customXml/itemProps2.xml><?xml version="1.0" encoding="utf-8"?>
-<ds:datastoreItem xmlns:ds="http://schemas.openxmlformats.org/officeDocument/2006/customXml" ds:itemID="{3473EA1A-2744-48E8-B2A3-4F89C0FC849C}">
-  <ds:schemaRefs>
-    <ds:schemaRef ds:uri="http://purl.org/dc/elements/1.1/"/>
-    <ds:schemaRef ds:uri="http://schemas.microsoft.com/office/2006/documentManagement/types"/>
-    <ds:schemaRef ds:uri="http://purl.org/dc/terms/"/>
-    <ds:schemaRef ds:uri="http://schemas.openxmlformats.org/package/2006/metadata/core-properties"/>
-    <ds:schemaRef ds:uri="http://purl.org/dc/dcmitype/"/>
-    <ds:schemaRef ds:uri="http://schemas.microsoft.com/office/infopath/2007/PartnerControls"/>
-    <ds:schemaRef ds:uri="http://schemas.microsoft.com/office/2006/metadata/properties"/>
-    <ds:schemaRef ds:uri="http://www.w3.org/XML/1998/namespace"/>
-  </ds:schemaRefs>
-</ds:datastoreItem>
-</file>
-
-<file path=customXml/itemProps3.xml><?xml version="1.0" encoding="utf-8"?>
-<ds:datastoreItem xmlns:ds="http://schemas.openxmlformats.org/officeDocument/2006/customXml" ds:itemID="{87FD8B20-B89A-4B23-9329-175195DD4D8A}">
-  <ds:schemaRefs>
-    <ds:schemaRef ds:uri="http://schemas.microsoft.com/sharepoint/v3/contenttype/forms"/>
-  </ds:schemaRefs>
-</ds:datastoreItem>
 </file>
</xml_diff>